<commit_message>
modif diapo + correction d'une faute dans le projet
</commit_message>
<xml_diff>
--- a/RDV/RDV2/EasyTask.pptx
+++ b/RDV/RDV2/EasyTask.pptx
@@ -2,28 +2,29 @@
 <file path=ppt/presentation.xml><?xml version="1.0" encoding="utf-8"?>
 <p:presentation xmlns:a="http://schemas.openxmlformats.org/drawingml/2006/main" xmlns:r="http://schemas.openxmlformats.org/officeDocument/2006/relationships" xmlns:p="http://schemas.openxmlformats.org/presentationml/2006/main" showSpecialPlsOnTitleSld="0" autoCompressPictures="0">
   <p:sldMasterIdLst>
-    <p:sldMasterId id="2147483775" r:id="rId1"/>
+    <p:sldMasterId id="2147483787" r:id="rId1"/>
   </p:sldMasterIdLst>
   <p:notesMasterIdLst>
-    <p:notesMasterId r:id="rId10"/>
+    <p:notesMasterId r:id="rId11"/>
   </p:notesMasterIdLst>
   <p:sldIdLst>
     <p:sldId id="260" r:id="rId2"/>
     <p:sldId id="259" r:id="rId3"/>
     <p:sldId id="261" r:id="rId4"/>
     <p:sldId id="262" r:id="rId5"/>
-    <p:sldId id="263" r:id="rId6"/>
-    <p:sldId id="264" r:id="rId7"/>
-    <p:sldId id="265" r:id="rId8"/>
-    <p:sldId id="266" r:id="rId9"/>
+    <p:sldId id="267" r:id="rId6"/>
+    <p:sldId id="263" r:id="rId7"/>
+    <p:sldId id="264" r:id="rId8"/>
+    <p:sldId id="265" r:id="rId9"/>
+    <p:sldId id="266" r:id="rId10"/>
   </p:sldIdLst>
   <p:sldSz cx="12192000" cy="6858000"/>
   <p:notesSz cx="6858000" cy="9144000"/>
   <p:defaultTextStyle>
     <a:defPPr>
-      <a:defRPr lang="fr-FR"/>
+      <a:defRPr lang="en-US"/>
     </a:defPPr>
-    <a:lvl1pPr marL="0" algn="l" defTabSz="914400" rtl="0" eaLnBrk="1" latinLnBrk="0" hangingPunct="1">
+    <a:lvl1pPr marL="0" algn="l" defTabSz="457200" rtl="0" eaLnBrk="1" latinLnBrk="0" hangingPunct="1">
       <a:defRPr sz="1800" kern="1200">
         <a:solidFill>
           <a:schemeClr val="tx1"/>
@@ -33,7 +34,7 @@
         <a:cs typeface="+mn-cs"/>
       </a:defRPr>
     </a:lvl1pPr>
-    <a:lvl2pPr marL="457200" algn="l" defTabSz="914400" rtl="0" eaLnBrk="1" latinLnBrk="0" hangingPunct="1">
+    <a:lvl2pPr marL="457200" algn="l" defTabSz="457200" rtl="0" eaLnBrk="1" latinLnBrk="0" hangingPunct="1">
       <a:defRPr sz="1800" kern="1200">
         <a:solidFill>
           <a:schemeClr val="tx1"/>
@@ -43,7 +44,7 @@
         <a:cs typeface="+mn-cs"/>
       </a:defRPr>
     </a:lvl2pPr>
-    <a:lvl3pPr marL="914400" algn="l" defTabSz="914400" rtl="0" eaLnBrk="1" latinLnBrk="0" hangingPunct="1">
+    <a:lvl3pPr marL="914400" algn="l" defTabSz="457200" rtl="0" eaLnBrk="1" latinLnBrk="0" hangingPunct="1">
       <a:defRPr sz="1800" kern="1200">
         <a:solidFill>
           <a:schemeClr val="tx1"/>
@@ -53,7 +54,7 @@
         <a:cs typeface="+mn-cs"/>
       </a:defRPr>
     </a:lvl3pPr>
-    <a:lvl4pPr marL="1371600" algn="l" defTabSz="914400" rtl="0" eaLnBrk="1" latinLnBrk="0" hangingPunct="1">
+    <a:lvl4pPr marL="1371600" algn="l" defTabSz="457200" rtl="0" eaLnBrk="1" latinLnBrk="0" hangingPunct="1">
       <a:defRPr sz="1800" kern="1200">
         <a:solidFill>
           <a:schemeClr val="tx1"/>
@@ -63,7 +64,7 @@
         <a:cs typeface="+mn-cs"/>
       </a:defRPr>
     </a:lvl4pPr>
-    <a:lvl5pPr marL="1828800" algn="l" defTabSz="914400" rtl="0" eaLnBrk="1" latinLnBrk="0" hangingPunct="1">
+    <a:lvl5pPr marL="1828800" algn="l" defTabSz="457200" rtl="0" eaLnBrk="1" latinLnBrk="0" hangingPunct="1">
       <a:defRPr sz="1800" kern="1200">
         <a:solidFill>
           <a:schemeClr val="tx1"/>
@@ -73,7 +74,7 @@
         <a:cs typeface="+mn-cs"/>
       </a:defRPr>
     </a:lvl5pPr>
-    <a:lvl6pPr marL="2286000" algn="l" defTabSz="914400" rtl="0" eaLnBrk="1" latinLnBrk="0" hangingPunct="1">
+    <a:lvl6pPr marL="2286000" algn="l" defTabSz="457200" rtl="0" eaLnBrk="1" latinLnBrk="0" hangingPunct="1">
       <a:defRPr sz="1800" kern="1200">
         <a:solidFill>
           <a:schemeClr val="tx1"/>
@@ -83,7 +84,7 @@
         <a:cs typeface="+mn-cs"/>
       </a:defRPr>
     </a:lvl6pPr>
-    <a:lvl7pPr marL="2743200" algn="l" defTabSz="914400" rtl="0" eaLnBrk="1" latinLnBrk="0" hangingPunct="1">
+    <a:lvl7pPr marL="2743200" algn="l" defTabSz="457200" rtl="0" eaLnBrk="1" latinLnBrk="0" hangingPunct="1">
       <a:defRPr sz="1800" kern="1200">
         <a:solidFill>
           <a:schemeClr val="tx1"/>
@@ -93,7 +94,7 @@
         <a:cs typeface="+mn-cs"/>
       </a:defRPr>
     </a:lvl7pPr>
-    <a:lvl8pPr marL="3200400" algn="l" defTabSz="914400" rtl="0" eaLnBrk="1" latinLnBrk="0" hangingPunct="1">
+    <a:lvl8pPr marL="3200400" algn="l" defTabSz="457200" rtl="0" eaLnBrk="1" latinLnBrk="0" hangingPunct="1">
       <a:defRPr sz="1800" kern="1200">
         <a:solidFill>
           <a:schemeClr val="tx1"/>
@@ -103,7 +104,7 @@
         <a:cs typeface="+mn-cs"/>
       </a:defRPr>
     </a:lvl8pPr>
-    <a:lvl9pPr marL="3657600" algn="l" defTabSz="914400" rtl="0" eaLnBrk="1" latinLnBrk="0" hangingPunct="1">
+    <a:lvl9pPr marL="3657600" algn="l" defTabSz="457200" rtl="0" eaLnBrk="1" latinLnBrk="0" hangingPunct="1">
       <a:defRPr sz="1800" kern="1200">
         <a:solidFill>
           <a:schemeClr val="tx1"/>
@@ -114,6 +115,11 @@
       </a:defRPr>
     </a:lvl9pPr>
   </p:defaultTextStyle>
+  <p:extLst>
+    <p:ext uri="{EFAFB233-063F-42B5-8137-9DF3F51BA10A}">
+      <p15:sldGuideLst xmlns:p15="http://schemas.microsoft.com/office/powerpoint/2012/main"/>
+    </p:ext>
+  </p:extLst>
 </p:presentation>
 </file>
 
@@ -485,13 +491,7 @@
       </p:grpSpPr>
       <p:sp>
         <p:nvSpPr>
-          <p:cNvPr id="2" name="Titre 1">
-            <a:extLst>
-              <a:ext uri="{FF2B5EF4-FFF2-40B4-BE49-F238E27FC236}">
-                <a16:creationId xmlns:a16="http://schemas.microsoft.com/office/drawing/2014/main" id="{19DB13A0-806F-4177-A233-82DA6B48310D}"/>
-              </a:ext>
-            </a:extLst>
-          </p:cNvPr>
+          <p:cNvPr id="2" name="Title 1"/>
           <p:cNvSpPr>
             <a:spLocks noGrp="1"/>
           </p:cNvSpPr>
@@ -517,18 +517,13 @@
               <a:rPr lang="fr-FR"/>
               <a:t>Modifiez le style du titre</a:t>
             </a:r>
-          </a:p>
-        </p:txBody>
-      </p:sp>
-      <p:sp>
-        <p:nvSpPr>
-          <p:cNvPr id="3" name="Sous-titre 2">
-            <a:extLst>
-              <a:ext uri="{FF2B5EF4-FFF2-40B4-BE49-F238E27FC236}">
-                <a16:creationId xmlns:a16="http://schemas.microsoft.com/office/drawing/2014/main" id="{5F0B5444-D4E2-46EA-A04B-EA01E249CFB6}"/>
-              </a:ext>
-            </a:extLst>
-          </p:cNvPr>
+            <a:endParaRPr lang="en-US" dirty="0"/>
+          </a:p>
+        </p:txBody>
+      </p:sp>
+      <p:sp>
+        <p:nvSpPr>
+          <p:cNvPr id="3" name="Subtitle 2"/>
           <p:cNvSpPr>
             <a:spLocks noGrp="1"/>
           </p:cNvSpPr>
@@ -587,18 +582,13 @@
               <a:rPr lang="fr-FR"/>
               <a:t>Modifiez le style des sous-titres du masque</a:t>
             </a:r>
-          </a:p>
-        </p:txBody>
-      </p:sp>
-      <p:sp>
-        <p:nvSpPr>
-          <p:cNvPr id="4" name="Espace réservé de la date 3">
-            <a:extLst>
-              <a:ext uri="{FF2B5EF4-FFF2-40B4-BE49-F238E27FC236}">
-                <a16:creationId xmlns:a16="http://schemas.microsoft.com/office/drawing/2014/main" id="{F106EB77-86A1-4C52-B5E4-1BF258D96D6A}"/>
-              </a:ext>
-            </a:extLst>
-          </p:cNvPr>
+            <a:endParaRPr lang="en-US" dirty="0"/>
+          </a:p>
+        </p:txBody>
+      </p:sp>
+      <p:sp>
+        <p:nvSpPr>
+          <p:cNvPr id="4" name="Date Placeholder 3"/>
           <p:cNvSpPr>
             <a:spLocks noGrp="1"/>
           </p:cNvSpPr>
@@ -621,13 +611,7 @@
       </p:sp>
       <p:sp>
         <p:nvSpPr>
-          <p:cNvPr id="5" name="Espace réservé du pied de page 4">
-            <a:extLst>
-              <a:ext uri="{FF2B5EF4-FFF2-40B4-BE49-F238E27FC236}">
-                <a16:creationId xmlns:a16="http://schemas.microsoft.com/office/drawing/2014/main" id="{01622BB0-2848-4785-98C3-0B5D1664607A}"/>
-              </a:ext>
-            </a:extLst>
-          </p:cNvPr>
+          <p:cNvPr id="5" name="Footer Placeholder 4"/>
           <p:cNvSpPr>
             <a:spLocks noGrp="1"/>
           </p:cNvSpPr>
@@ -646,13 +630,7 @@
       </p:sp>
       <p:sp>
         <p:nvSpPr>
-          <p:cNvPr id="6" name="Espace réservé du numéro de diapositive 5">
-            <a:extLst>
-              <a:ext uri="{FF2B5EF4-FFF2-40B4-BE49-F238E27FC236}">
-                <a16:creationId xmlns:a16="http://schemas.microsoft.com/office/drawing/2014/main" id="{9E3E9D53-97DE-4C3A-A829-98EA213E5B35}"/>
-              </a:ext>
-            </a:extLst>
-          </p:cNvPr>
+          <p:cNvPr id="6" name="Slide Number Placeholder 5"/>
           <p:cNvSpPr>
             <a:spLocks noGrp="1"/>
           </p:cNvSpPr>
@@ -676,7 +654,7 @@
     </p:spTree>
     <p:extLst>
       <p:ext uri="{BB962C8B-B14F-4D97-AF65-F5344CB8AC3E}">
-        <p14:creationId xmlns:p14="http://schemas.microsoft.com/office/powerpoint/2010/main" val="1169180051"/>
+        <p14:creationId xmlns:p14="http://schemas.microsoft.com/office/powerpoint/2010/main" val="1470078198"/>
       </p:ext>
     </p:extLst>
   </p:cSld>
@@ -705,13 +683,7 @@
       </p:grpSpPr>
       <p:sp>
         <p:nvSpPr>
-          <p:cNvPr id="2" name="Titre 1">
-            <a:extLst>
-              <a:ext uri="{FF2B5EF4-FFF2-40B4-BE49-F238E27FC236}">
-                <a16:creationId xmlns:a16="http://schemas.microsoft.com/office/drawing/2014/main" id="{98953E46-DFD0-496B-9B26-F5A5E3A0F86D}"/>
-              </a:ext>
-            </a:extLst>
-          </p:cNvPr>
+          <p:cNvPr id="2" name="Title 1"/>
           <p:cNvSpPr>
             <a:spLocks noGrp="1"/>
           </p:cNvSpPr>
@@ -728,18 +700,13 @@
               <a:rPr lang="fr-FR"/>
               <a:t>Modifiez le style du titre</a:t>
             </a:r>
-          </a:p>
-        </p:txBody>
-      </p:sp>
-      <p:sp>
-        <p:nvSpPr>
-          <p:cNvPr id="3" name="Espace réservé du texte vertical 2">
-            <a:extLst>
-              <a:ext uri="{FF2B5EF4-FFF2-40B4-BE49-F238E27FC236}">
-                <a16:creationId xmlns:a16="http://schemas.microsoft.com/office/drawing/2014/main" id="{429B7F31-1D79-4BA0-8DE4-F1E312197017}"/>
-              </a:ext>
-            </a:extLst>
-          </p:cNvPr>
+            <a:endParaRPr lang="en-US" dirty="0"/>
+          </a:p>
+        </p:txBody>
+      </p:sp>
+      <p:sp>
+        <p:nvSpPr>
+          <p:cNvPr id="3" name="Vertical Text Placeholder 2"/>
           <p:cNvSpPr>
             <a:spLocks noGrp="1"/>
           </p:cNvSpPr>
@@ -785,18 +752,13 @@
               <a:rPr lang="fr-FR"/>
               <a:t>Cinquième niveau</a:t>
             </a:r>
-          </a:p>
-        </p:txBody>
-      </p:sp>
-      <p:sp>
-        <p:nvSpPr>
-          <p:cNvPr id="4" name="Espace réservé de la date 3">
-            <a:extLst>
-              <a:ext uri="{FF2B5EF4-FFF2-40B4-BE49-F238E27FC236}">
-                <a16:creationId xmlns:a16="http://schemas.microsoft.com/office/drawing/2014/main" id="{53053E5E-0D3A-4FC9-8497-F29D8673754D}"/>
-              </a:ext>
-            </a:extLst>
-          </p:cNvPr>
+            <a:endParaRPr lang="en-US" dirty="0"/>
+          </a:p>
+        </p:txBody>
+      </p:sp>
+      <p:sp>
+        <p:nvSpPr>
+          <p:cNvPr id="4" name="Date Placeholder 3"/>
           <p:cNvSpPr>
             <a:spLocks noGrp="1"/>
           </p:cNvSpPr>
@@ -819,13 +781,7 @@
       </p:sp>
       <p:sp>
         <p:nvSpPr>
-          <p:cNvPr id="5" name="Espace réservé du pied de page 4">
-            <a:extLst>
-              <a:ext uri="{FF2B5EF4-FFF2-40B4-BE49-F238E27FC236}">
-                <a16:creationId xmlns:a16="http://schemas.microsoft.com/office/drawing/2014/main" id="{2F240BA1-CE6E-41B7-857E-631576CEA56B}"/>
-              </a:ext>
-            </a:extLst>
-          </p:cNvPr>
+          <p:cNvPr id="5" name="Footer Placeholder 4"/>
           <p:cNvSpPr>
             <a:spLocks noGrp="1"/>
           </p:cNvSpPr>
@@ -844,13 +800,7 @@
       </p:sp>
       <p:sp>
         <p:nvSpPr>
-          <p:cNvPr id="6" name="Espace réservé du numéro de diapositive 5">
-            <a:extLst>
-              <a:ext uri="{FF2B5EF4-FFF2-40B4-BE49-F238E27FC236}">
-                <a16:creationId xmlns:a16="http://schemas.microsoft.com/office/drawing/2014/main" id="{87EAA49B-0D02-4AF6-A668-728F2C39A691}"/>
-              </a:ext>
-            </a:extLst>
-          </p:cNvPr>
+          <p:cNvPr id="6" name="Slide Number Placeholder 5"/>
           <p:cNvSpPr>
             <a:spLocks noGrp="1"/>
           </p:cNvSpPr>
@@ -874,7 +824,7 @@
     </p:spTree>
     <p:extLst>
       <p:ext uri="{BB962C8B-B14F-4D97-AF65-F5344CB8AC3E}">
-        <p14:creationId xmlns:p14="http://schemas.microsoft.com/office/powerpoint/2010/main" val="722998218"/>
+        <p14:creationId xmlns:p14="http://schemas.microsoft.com/office/powerpoint/2010/main" val="1921518379"/>
       </p:ext>
     </p:extLst>
   </p:cSld>
@@ -903,13 +853,7 @@
       </p:grpSpPr>
       <p:sp>
         <p:nvSpPr>
-          <p:cNvPr id="2" name="Titre vertical 1">
-            <a:extLst>
-              <a:ext uri="{FF2B5EF4-FFF2-40B4-BE49-F238E27FC236}">
-                <a16:creationId xmlns:a16="http://schemas.microsoft.com/office/drawing/2014/main" id="{09C91F92-4C92-4A6D-9955-7A774B6D6FB2}"/>
-              </a:ext>
-            </a:extLst>
-          </p:cNvPr>
+          <p:cNvPr id="2" name="Vertical Title 1"/>
           <p:cNvSpPr>
             <a:spLocks noGrp="1"/>
           </p:cNvSpPr>
@@ -931,18 +875,13 @@
               <a:rPr lang="fr-FR"/>
               <a:t>Modifiez le style du titre</a:t>
             </a:r>
-          </a:p>
-        </p:txBody>
-      </p:sp>
-      <p:sp>
-        <p:nvSpPr>
-          <p:cNvPr id="3" name="Espace réservé du texte vertical 2">
-            <a:extLst>
-              <a:ext uri="{FF2B5EF4-FFF2-40B4-BE49-F238E27FC236}">
-                <a16:creationId xmlns:a16="http://schemas.microsoft.com/office/drawing/2014/main" id="{AE7F9C78-E589-42DB-B4B4-D60C5746D1ED}"/>
-              </a:ext>
-            </a:extLst>
-          </p:cNvPr>
+            <a:endParaRPr lang="en-US" dirty="0"/>
+          </a:p>
+        </p:txBody>
+      </p:sp>
+      <p:sp>
+        <p:nvSpPr>
+          <p:cNvPr id="3" name="Vertical Text Placeholder 2"/>
           <p:cNvSpPr>
             <a:spLocks noGrp="1"/>
           </p:cNvSpPr>
@@ -993,18 +932,13 @@
               <a:rPr lang="fr-FR"/>
               <a:t>Cinquième niveau</a:t>
             </a:r>
-          </a:p>
-        </p:txBody>
-      </p:sp>
-      <p:sp>
-        <p:nvSpPr>
-          <p:cNvPr id="4" name="Espace réservé de la date 3">
-            <a:extLst>
-              <a:ext uri="{FF2B5EF4-FFF2-40B4-BE49-F238E27FC236}">
-                <a16:creationId xmlns:a16="http://schemas.microsoft.com/office/drawing/2014/main" id="{05B66975-3B55-414B-AB58-74987C57F31B}"/>
-              </a:ext>
-            </a:extLst>
-          </p:cNvPr>
+            <a:endParaRPr lang="en-US" dirty="0"/>
+          </a:p>
+        </p:txBody>
+      </p:sp>
+      <p:sp>
+        <p:nvSpPr>
+          <p:cNvPr id="4" name="Date Placeholder 3"/>
           <p:cNvSpPr>
             <a:spLocks noGrp="1"/>
           </p:cNvSpPr>
@@ -1027,13 +961,7 @@
       </p:sp>
       <p:sp>
         <p:nvSpPr>
-          <p:cNvPr id="5" name="Espace réservé du pied de page 4">
-            <a:extLst>
-              <a:ext uri="{FF2B5EF4-FFF2-40B4-BE49-F238E27FC236}">
-                <a16:creationId xmlns:a16="http://schemas.microsoft.com/office/drawing/2014/main" id="{AC7F61C9-CB2C-499C-8AA8-03766B386FC4}"/>
-              </a:ext>
-            </a:extLst>
-          </p:cNvPr>
+          <p:cNvPr id="5" name="Footer Placeholder 4"/>
           <p:cNvSpPr>
             <a:spLocks noGrp="1"/>
           </p:cNvSpPr>
@@ -1052,13 +980,7 @@
       </p:sp>
       <p:sp>
         <p:nvSpPr>
-          <p:cNvPr id="6" name="Espace réservé du numéro de diapositive 5">
-            <a:extLst>
-              <a:ext uri="{FF2B5EF4-FFF2-40B4-BE49-F238E27FC236}">
-                <a16:creationId xmlns:a16="http://schemas.microsoft.com/office/drawing/2014/main" id="{EF8A33CD-D8CA-42EB-9F48-C80D7BA8490D}"/>
-              </a:ext>
-            </a:extLst>
-          </p:cNvPr>
+          <p:cNvPr id="6" name="Slide Number Placeholder 5"/>
           <p:cNvSpPr>
             <a:spLocks noGrp="1"/>
           </p:cNvSpPr>
@@ -1082,7 +1004,7 @@
     </p:spTree>
     <p:extLst>
       <p:ext uri="{BB962C8B-B14F-4D97-AF65-F5344CB8AC3E}">
-        <p14:creationId xmlns:p14="http://schemas.microsoft.com/office/powerpoint/2010/main" val="2585672163"/>
+        <p14:creationId xmlns:p14="http://schemas.microsoft.com/office/powerpoint/2010/main" val="1594498722"/>
       </p:ext>
     </p:extLst>
   </p:cSld>
@@ -1111,13 +1033,7 @@
       </p:grpSpPr>
       <p:sp>
         <p:nvSpPr>
-          <p:cNvPr id="2" name="Titre 1">
-            <a:extLst>
-              <a:ext uri="{FF2B5EF4-FFF2-40B4-BE49-F238E27FC236}">
-                <a16:creationId xmlns:a16="http://schemas.microsoft.com/office/drawing/2014/main" id="{85EF390E-8A2D-44C3-9BEA-818BA006627B}"/>
-              </a:ext>
-            </a:extLst>
-          </p:cNvPr>
+          <p:cNvPr id="2" name="Title 1"/>
           <p:cNvSpPr>
             <a:spLocks noGrp="1"/>
           </p:cNvSpPr>
@@ -1134,18 +1050,13 @@
               <a:rPr lang="fr-FR"/>
               <a:t>Modifiez le style du titre</a:t>
             </a:r>
-          </a:p>
-        </p:txBody>
-      </p:sp>
-      <p:sp>
-        <p:nvSpPr>
-          <p:cNvPr id="3" name="Espace réservé du contenu 2">
-            <a:extLst>
-              <a:ext uri="{FF2B5EF4-FFF2-40B4-BE49-F238E27FC236}">
-                <a16:creationId xmlns:a16="http://schemas.microsoft.com/office/drawing/2014/main" id="{AE1E9069-D269-4DF3-A5B6-C22075FEE48C}"/>
-              </a:ext>
-            </a:extLst>
-          </p:cNvPr>
+            <a:endParaRPr lang="en-US" dirty="0"/>
+          </a:p>
+        </p:txBody>
+      </p:sp>
+      <p:sp>
+        <p:nvSpPr>
+          <p:cNvPr id="3" name="Content Placeholder 2"/>
           <p:cNvSpPr>
             <a:spLocks noGrp="1"/>
           </p:cNvSpPr>
@@ -1191,18 +1102,13 @@
               <a:rPr lang="fr-FR"/>
               <a:t>Cinquième niveau</a:t>
             </a:r>
-          </a:p>
-        </p:txBody>
-      </p:sp>
-      <p:sp>
-        <p:nvSpPr>
-          <p:cNvPr id="4" name="Espace réservé de la date 3">
-            <a:extLst>
-              <a:ext uri="{FF2B5EF4-FFF2-40B4-BE49-F238E27FC236}">
-                <a16:creationId xmlns:a16="http://schemas.microsoft.com/office/drawing/2014/main" id="{3D257092-7D54-493B-A03B-8D73D36ADAF8}"/>
-              </a:ext>
-            </a:extLst>
-          </p:cNvPr>
+            <a:endParaRPr lang="en-US" dirty="0"/>
+          </a:p>
+        </p:txBody>
+      </p:sp>
+      <p:sp>
+        <p:nvSpPr>
+          <p:cNvPr id="4" name="Date Placeholder 3"/>
           <p:cNvSpPr>
             <a:spLocks noGrp="1"/>
           </p:cNvSpPr>
@@ -1225,13 +1131,7 @@
       </p:sp>
       <p:sp>
         <p:nvSpPr>
-          <p:cNvPr id="5" name="Espace réservé du pied de page 4">
-            <a:extLst>
-              <a:ext uri="{FF2B5EF4-FFF2-40B4-BE49-F238E27FC236}">
-                <a16:creationId xmlns:a16="http://schemas.microsoft.com/office/drawing/2014/main" id="{E84C73A6-8192-492F-B156-49F349EBFF67}"/>
-              </a:ext>
-            </a:extLst>
-          </p:cNvPr>
+          <p:cNvPr id="5" name="Footer Placeholder 4"/>
           <p:cNvSpPr>
             <a:spLocks noGrp="1"/>
           </p:cNvSpPr>
@@ -1250,13 +1150,7 @@
       </p:sp>
       <p:sp>
         <p:nvSpPr>
-          <p:cNvPr id="6" name="Espace réservé du numéro de diapositive 5">
-            <a:extLst>
-              <a:ext uri="{FF2B5EF4-FFF2-40B4-BE49-F238E27FC236}">
-                <a16:creationId xmlns:a16="http://schemas.microsoft.com/office/drawing/2014/main" id="{F413AFBE-02F1-4842-BDDE-20C2C31A4F0B}"/>
-              </a:ext>
-            </a:extLst>
-          </p:cNvPr>
+          <p:cNvPr id="6" name="Slide Number Placeholder 5"/>
           <p:cNvSpPr>
             <a:spLocks noGrp="1"/>
           </p:cNvSpPr>
@@ -1280,7 +1174,7 @@
     </p:spTree>
     <p:extLst>
       <p:ext uri="{BB962C8B-B14F-4D97-AF65-F5344CB8AC3E}">
-        <p14:creationId xmlns:p14="http://schemas.microsoft.com/office/powerpoint/2010/main" val="3558007687"/>
+        <p14:creationId xmlns:p14="http://schemas.microsoft.com/office/powerpoint/2010/main" val="1332990378"/>
       </p:ext>
     </p:extLst>
   </p:cSld>
@@ -1309,13 +1203,7 @@
       </p:grpSpPr>
       <p:sp>
         <p:nvSpPr>
-          <p:cNvPr id="2" name="Titre 1">
-            <a:extLst>
-              <a:ext uri="{FF2B5EF4-FFF2-40B4-BE49-F238E27FC236}">
-                <a16:creationId xmlns:a16="http://schemas.microsoft.com/office/drawing/2014/main" id="{7AEE310A-9D28-4581-BD3C-D70D2586CF28}"/>
-              </a:ext>
-            </a:extLst>
-          </p:cNvPr>
+          <p:cNvPr id="2" name="Title 1"/>
           <p:cNvSpPr>
             <a:spLocks noGrp="1"/>
           </p:cNvSpPr>
@@ -1341,18 +1229,13 @@
               <a:rPr lang="fr-FR"/>
               <a:t>Modifiez le style du titre</a:t>
             </a:r>
-          </a:p>
-        </p:txBody>
-      </p:sp>
-      <p:sp>
-        <p:nvSpPr>
-          <p:cNvPr id="3" name="Espace réservé du texte 2">
-            <a:extLst>
-              <a:ext uri="{FF2B5EF4-FFF2-40B4-BE49-F238E27FC236}">
-                <a16:creationId xmlns:a16="http://schemas.microsoft.com/office/drawing/2014/main" id="{4E8DBC30-C3FA-43BA-8185-4443579E1A81}"/>
-              </a:ext>
-            </a:extLst>
-          </p:cNvPr>
+            <a:endParaRPr lang="en-US" dirty="0"/>
+          </a:p>
+        </p:txBody>
+      </p:sp>
+      <p:sp>
+        <p:nvSpPr>
+          <p:cNvPr id="3" name="Text Placeholder 2"/>
           <p:cNvSpPr>
             <a:spLocks noGrp="1"/>
           </p:cNvSpPr>
@@ -1471,13 +1354,7 @@
       </p:sp>
       <p:sp>
         <p:nvSpPr>
-          <p:cNvPr id="4" name="Espace réservé de la date 3">
-            <a:extLst>
-              <a:ext uri="{FF2B5EF4-FFF2-40B4-BE49-F238E27FC236}">
-                <a16:creationId xmlns:a16="http://schemas.microsoft.com/office/drawing/2014/main" id="{FCA6ADC7-BF6F-4533-BC7D-7D544BFDF3F7}"/>
-              </a:ext>
-            </a:extLst>
-          </p:cNvPr>
+          <p:cNvPr id="4" name="Date Placeholder 3"/>
           <p:cNvSpPr>
             <a:spLocks noGrp="1"/>
           </p:cNvSpPr>
@@ -1500,13 +1377,7 @@
       </p:sp>
       <p:sp>
         <p:nvSpPr>
-          <p:cNvPr id="5" name="Espace réservé du pied de page 4">
-            <a:extLst>
-              <a:ext uri="{FF2B5EF4-FFF2-40B4-BE49-F238E27FC236}">
-                <a16:creationId xmlns:a16="http://schemas.microsoft.com/office/drawing/2014/main" id="{8D7CCAFE-9D17-45C1-89D1-68D2BE5361D3}"/>
-              </a:ext>
-            </a:extLst>
-          </p:cNvPr>
+          <p:cNvPr id="5" name="Footer Placeholder 4"/>
           <p:cNvSpPr>
             <a:spLocks noGrp="1"/>
           </p:cNvSpPr>
@@ -1525,13 +1396,7 @@
       </p:sp>
       <p:sp>
         <p:nvSpPr>
-          <p:cNvPr id="6" name="Espace réservé du numéro de diapositive 5">
-            <a:extLst>
-              <a:ext uri="{FF2B5EF4-FFF2-40B4-BE49-F238E27FC236}">
-                <a16:creationId xmlns:a16="http://schemas.microsoft.com/office/drawing/2014/main" id="{DBBE1FC5-F84A-413F-8F92-0936EDFF1EB0}"/>
-              </a:ext>
-            </a:extLst>
-          </p:cNvPr>
+          <p:cNvPr id="6" name="Slide Number Placeholder 5"/>
           <p:cNvSpPr>
             <a:spLocks noGrp="1"/>
           </p:cNvSpPr>
@@ -1555,7 +1420,7 @@
     </p:spTree>
     <p:extLst>
       <p:ext uri="{BB962C8B-B14F-4D97-AF65-F5344CB8AC3E}">
-        <p14:creationId xmlns:p14="http://schemas.microsoft.com/office/powerpoint/2010/main" val="809972627"/>
+        <p14:creationId xmlns:p14="http://schemas.microsoft.com/office/powerpoint/2010/main" val="2442960134"/>
       </p:ext>
     </p:extLst>
   </p:cSld>
@@ -1584,13 +1449,7 @@
       </p:grpSpPr>
       <p:sp>
         <p:nvSpPr>
-          <p:cNvPr id="2" name="Titre 1">
-            <a:extLst>
-              <a:ext uri="{FF2B5EF4-FFF2-40B4-BE49-F238E27FC236}">
-                <a16:creationId xmlns:a16="http://schemas.microsoft.com/office/drawing/2014/main" id="{29DC74F8-F5CD-498C-BCE6-01EFA16DD084}"/>
-              </a:ext>
-            </a:extLst>
-          </p:cNvPr>
+          <p:cNvPr id="2" name="Title 1"/>
           <p:cNvSpPr>
             <a:spLocks noGrp="1"/>
           </p:cNvSpPr>
@@ -1607,18 +1466,13 @@
               <a:rPr lang="fr-FR"/>
               <a:t>Modifiez le style du titre</a:t>
             </a:r>
-          </a:p>
-        </p:txBody>
-      </p:sp>
-      <p:sp>
-        <p:nvSpPr>
-          <p:cNvPr id="3" name="Espace réservé du contenu 2">
-            <a:extLst>
-              <a:ext uri="{FF2B5EF4-FFF2-40B4-BE49-F238E27FC236}">
-                <a16:creationId xmlns:a16="http://schemas.microsoft.com/office/drawing/2014/main" id="{F1BA79DD-7E39-49D1-B599-9332C6964507}"/>
-              </a:ext>
-            </a:extLst>
-          </p:cNvPr>
+            <a:endParaRPr lang="en-US" dirty="0"/>
+          </a:p>
+        </p:txBody>
+      </p:sp>
+      <p:sp>
+        <p:nvSpPr>
+          <p:cNvPr id="3" name="Content Placeholder 2"/>
           <p:cNvSpPr>
             <a:spLocks noGrp="1"/>
           </p:cNvSpPr>
@@ -1669,18 +1523,13 @@
               <a:rPr lang="fr-FR"/>
               <a:t>Cinquième niveau</a:t>
             </a:r>
-          </a:p>
-        </p:txBody>
-      </p:sp>
-      <p:sp>
-        <p:nvSpPr>
-          <p:cNvPr id="4" name="Espace réservé du contenu 3">
-            <a:extLst>
-              <a:ext uri="{FF2B5EF4-FFF2-40B4-BE49-F238E27FC236}">
-                <a16:creationId xmlns:a16="http://schemas.microsoft.com/office/drawing/2014/main" id="{210B5996-7270-472C-AE07-02EBE5CA50A8}"/>
-              </a:ext>
-            </a:extLst>
-          </p:cNvPr>
+            <a:endParaRPr lang="en-US" dirty="0"/>
+          </a:p>
+        </p:txBody>
+      </p:sp>
+      <p:sp>
+        <p:nvSpPr>
+          <p:cNvPr id="4" name="Content Placeholder 3"/>
           <p:cNvSpPr>
             <a:spLocks noGrp="1"/>
           </p:cNvSpPr>
@@ -1731,18 +1580,13 @@
               <a:rPr lang="fr-FR"/>
               <a:t>Cinquième niveau</a:t>
             </a:r>
-          </a:p>
-        </p:txBody>
-      </p:sp>
-      <p:sp>
-        <p:nvSpPr>
-          <p:cNvPr id="5" name="Espace réservé de la date 4">
-            <a:extLst>
-              <a:ext uri="{FF2B5EF4-FFF2-40B4-BE49-F238E27FC236}">
-                <a16:creationId xmlns:a16="http://schemas.microsoft.com/office/drawing/2014/main" id="{54EB31E4-CC62-446D-8795-1EC45833AB5F}"/>
-              </a:ext>
-            </a:extLst>
-          </p:cNvPr>
+            <a:endParaRPr lang="en-US" dirty="0"/>
+          </a:p>
+        </p:txBody>
+      </p:sp>
+      <p:sp>
+        <p:nvSpPr>
+          <p:cNvPr id="5" name="Date Placeholder 4"/>
           <p:cNvSpPr>
             <a:spLocks noGrp="1"/>
           </p:cNvSpPr>
@@ -1765,13 +1609,7 @@
       </p:sp>
       <p:sp>
         <p:nvSpPr>
-          <p:cNvPr id="6" name="Espace réservé du pied de page 5">
-            <a:extLst>
-              <a:ext uri="{FF2B5EF4-FFF2-40B4-BE49-F238E27FC236}">
-                <a16:creationId xmlns:a16="http://schemas.microsoft.com/office/drawing/2014/main" id="{FE1E35EE-07F2-49B9-82AC-3296D3505B25}"/>
-              </a:ext>
-            </a:extLst>
-          </p:cNvPr>
+          <p:cNvPr id="6" name="Footer Placeholder 5"/>
           <p:cNvSpPr>
             <a:spLocks noGrp="1"/>
           </p:cNvSpPr>
@@ -1790,13 +1628,7 @@
       </p:sp>
       <p:sp>
         <p:nvSpPr>
-          <p:cNvPr id="7" name="Espace réservé du numéro de diapositive 6">
-            <a:extLst>
-              <a:ext uri="{FF2B5EF4-FFF2-40B4-BE49-F238E27FC236}">
-                <a16:creationId xmlns:a16="http://schemas.microsoft.com/office/drawing/2014/main" id="{379C8C35-F042-4CCD-AC84-910D72DA5AF2}"/>
-              </a:ext>
-            </a:extLst>
-          </p:cNvPr>
+          <p:cNvPr id="7" name="Slide Number Placeholder 6"/>
           <p:cNvSpPr>
             <a:spLocks noGrp="1"/>
           </p:cNvSpPr>
@@ -1820,7 +1652,7 @@
     </p:spTree>
     <p:extLst>
       <p:ext uri="{BB962C8B-B14F-4D97-AF65-F5344CB8AC3E}">
-        <p14:creationId xmlns:p14="http://schemas.microsoft.com/office/powerpoint/2010/main" val="2616564941"/>
+        <p14:creationId xmlns:p14="http://schemas.microsoft.com/office/powerpoint/2010/main" val="1005830431"/>
       </p:ext>
     </p:extLst>
   </p:cSld>
@@ -1849,13 +1681,7 @@
       </p:grpSpPr>
       <p:sp>
         <p:nvSpPr>
-          <p:cNvPr id="2" name="Titre 1">
-            <a:extLst>
-              <a:ext uri="{FF2B5EF4-FFF2-40B4-BE49-F238E27FC236}">
-                <a16:creationId xmlns:a16="http://schemas.microsoft.com/office/drawing/2014/main" id="{6A326E88-307C-4C96-A9D4-E58EF53F6E3D}"/>
-              </a:ext>
-            </a:extLst>
-          </p:cNvPr>
+          <p:cNvPr id="2" name="Title 1"/>
           <p:cNvSpPr>
             <a:spLocks noGrp="1"/>
           </p:cNvSpPr>
@@ -1877,18 +1703,13 @@
               <a:rPr lang="fr-FR"/>
               <a:t>Modifiez le style du titre</a:t>
             </a:r>
-          </a:p>
-        </p:txBody>
-      </p:sp>
-      <p:sp>
-        <p:nvSpPr>
-          <p:cNvPr id="3" name="Espace réservé du texte 2">
-            <a:extLst>
-              <a:ext uri="{FF2B5EF4-FFF2-40B4-BE49-F238E27FC236}">
-                <a16:creationId xmlns:a16="http://schemas.microsoft.com/office/drawing/2014/main" id="{31161A0F-3477-44B5-ABC2-AC28A4C27805}"/>
-              </a:ext>
-            </a:extLst>
-          </p:cNvPr>
+            <a:endParaRPr lang="en-US" dirty="0"/>
+          </a:p>
+        </p:txBody>
+      </p:sp>
+      <p:sp>
+        <p:nvSpPr>
+          <p:cNvPr id="3" name="Text Placeholder 2"/>
           <p:cNvSpPr>
             <a:spLocks noGrp="1"/>
           </p:cNvSpPr>
@@ -1953,13 +1774,7 @@
       </p:sp>
       <p:sp>
         <p:nvSpPr>
-          <p:cNvPr id="4" name="Espace réservé du contenu 3">
-            <a:extLst>
-              <a:ext uri="{FF2B5EF4-FFF2-40B4-BE49-F238E27FC236}">
-                <a16:creationId xmlns:a16="http://schemas.microsoft.com/office/drawing/2014/main" id="{6BA37434-5C78-40A7-B609-3D1BC83E36DB}"/>
-              </a:ext>
-            </a:extLst>
-          </p:cNvPr>
+          <p:cNvPr id="4" name="Content Placeholder 3"/>
           <p:cNvSpPr>
             <a:spLocks noGrp="1"/>
           </p:cNvSpPr>
@@ -2010,18 +1825,13 @@
               <a:rPr lang="fr-FR"/>
               <a:t>Cinquième niveau</a:t>
             </a:r>
-          </a:p>
-        </p:txBody>
-      </p:sp>
-      <p:sp>
-        <p:nvSpPr>
-          <p:cNvPr id="5" name="Espace réservé du texte 4">
-            <a:extLst>
-              <a:ext uri="{FF2B5EF4-FFF2-40B4-BE49-F238E27FC236}">
-                <a16:creationId xmlns:a16="http://schemas.microsoft.com/office/drawing/2014/main" id="{64F832E8-A92F-4487-9260-747403EAF5AF}"/>
-              </a:ext>
-            </a:extLst>
-          </p:cNvPr>
+            <a:endParaRPr lang="en-US" dirty="0"/>
+          </a:p>
+        </p:txBody>
+      </p:sp>
+      <p:sp>
+        <p:nvSpPr>
+          <p:cNvPr id="5" name="Text Placeholder 4"/>
           <p:cNvSpPr>
             <a:spLocks noGrp="1"/>
           </p:cNvSpPr>
@@ -2086,13 +1896,7 @@
       </p:sp>
       <p:sp>
         <p:nvSpPr>
-          <p:cNvPr id="6" name="Espace réservé du contenu 5">
-            <a:extLst>
-              <a:ext uri="{FF2B5EF4-FFF2-40B4-BE49-F238E27FC236}">
-                <a16:creationId xmlns:a16="http://schemas.microsoft.com/office/drawing/2014/main" id="{07AC5346-C17A-49DF-A08D-9E83BF5E4E87}"/>
-              </a:ext>
-            </a:extLst>
-          </p:cNvPr>
+          <p:cNvPr id="6" name="Content Placeholder 5"/>
           <p:cNvSpPr>
             <a:spLocks noGrp="1"/>
           </p:cNvSpPr>
@@ -2143,18 +1947,13 @@
               <a:rPr lang="fr-FR"/>
               <a:t>Cinquième niveau</a:t>
             </a:r>
-          </a:p>
-        </p:txBody>
-      </p:sp>
-      <p:sp>
-        <p:nvSpPr>
-          <p:cNvPr id="7" name="Espace réservé de la date 6">
-            <a:extLst>
-              <a:ext uri="{FF2B5EF4-FFF2-40B4-BE49-F238E27FC236}">
-                <a16:creationId xmlns:a16="http://schemas.microsoft.com/office/drawing/2014/main" id="{FE49C38E-D0D5-4C86-8256-263F9E4546DD}"/>
-              </a:ext>
-            </a:extLst>
-          </p:cNvPr>
+            <a:endParaRPr lang="en-US" dirty="0"/>
+          </a:p>
+        </p:txBody>
+      </p:sp>
+      <p:sp>
+        <p:nvSpPr>
+          <p:cNvPr id="7" name="Date Placeholder 6"/>
           <p:cNvSpPr>
             <a:spLocks noGrp="1"/>
           </p:cNvSpPr>
@@ -2177,13 +1976,7 @@
       </p:sp>
       <p:sp>
         <p:nvSpPr>
-          <p:cNvPr id="8" name="Espace réservé du pied de page 7">
-            <a:extLst>
-              <a:ext uri="{FF2B5EF4-FFF2-40B4-BE49-F238E27FC236}">
-                <a16:creationId xmlns:a16="http://schemas.microsoft.com/office/drawing/2014/main" id="{C9BDD73E-8749-4CF7-8EE7-46F7F1E0CB0F}"/>
-              </a:ext>
-            </a:extLst>
-          </p:cNvPr>
+          <p:cNvPr id="8" name="Footer Placeholder 7"/>
           <p:cNvSpPr>
             <a:spLocks noGrp="1"/>
           </p:cNvSpPr>
@@ -2202,13 +1995,7 @@
       </p:sp>
       <p:sp>
         <p:nvSpPr>
-          <p:cNvPr id="9" name="Espace réservé du numéro de diapositive 8">
-            <a:extLst>
-              <a:ext uri="{FF2B5EF4-FFF2-40B4-BE49-F238E27FC236}">
-                <a16:creationId xmlns:a16="http://schemas.microsoft.com/office/drawing/2014/main" id="{9080FAB9-2742-45C5-B163-FE7913BB1B35}"/>
-              </a:ext>
-            </a:extLst>
-          </p:cNvPr>
+          <p:cNvPr id="9" name="Slide Number Placeholder 8"/>
           <p:cNvSpPr>
             <a:spLocks noGrp="1"/>
           </p:cNvSpPr>
@@ -2232,7 +2019,7 @@
     </p:spTree>
     <p:extLst>
       <p:ext uri="{BB962C8B-B14F-4D97-AF65-F5344CB8AC3E}">
-        <p14:creationId xmlns:p14="http://schemas.microsoft.com/office/powerpoint/2010/main" val="1788443767"/>
+        <p14:creationId xmlns:p14="http://schemas.microsoft.com/office/powerpoint/2010/main" val="3167541392"/>
       </p:ext>
     </p:extLst>
   </p:cSld>
@@ -2261,13 +2048,7 @@
       </p:grpSpPr>
       <p:sp>
         <p:nvSpPr>
-          <p:cNvPr id="2" name="Titre 1">
-            <a:extLst>
-              <a:ext uri="{FF2B5EF4-FFF2-40B4-BE49-F238E27FC236}">
-                <a16:creationId xmlns:a16="http://schemas.microsoft.com/office/drawing/2014/main" id="{9A0695A7-DCD4-4CCD-8AAA-1E0EDDBA7EBE}"/>
-              </a:ext>
-            </a:extLst>
-          </p:cNvPr>
+          <p:cNvPr id="2" name="Title 1"/>
           <p:cNvSpPr>
             <a:spLocks noGrp="1"/>
           </p:cNvSpPr>
@@ -2284,18 +2065,13 @@
               <a:rPr lang="fr-FR"/>
               <a:t>Modifiez le style du titre</a:t>
             </a:r>
-          </a:p>
-        </p:txBody>
-      </p:sp>
-      <p:sp>
-        <p:nvSpPr>
-          <p:cNvPr id="3" name="Espace réservé de la date 2">
-            <a:extLst>
-              <a:ext uri="{FF2B5EF4-FFF2-40B4-BE49-F238E27FC236}">
-                <a16:creationId xmlns:a16="http://schemas.microsoft.com/office/drawing/2014/main" id="{C6DF01A9-4E40-433E-9AD7-2E92786D3BD2}"/>
-              </a:ext>
-            </a:extLst>
-          </p:cNvPr>
+            <a:endParaRPr lang="en-US" dirty="0"/>
+          </a:p>
+        </p:txBody>
+      </p:sp>
+      <p:sp>
+        <p:nvSpPr>
+          <p:cNvPr id="3" name="Date Placeholder 2"/>
           <p:cNvSpPr>
             <a:spLocks noGrp="1"/>
           </p:cNvSpPr>
@@ -2318,13 +2094,7 @@
       </p:sp>
       <p:sp>
         <p:nvSpPr>
-          <p:cNvPr id="4" name="Espace réservé du pied de page 3">
-            <a:extLst>
-              <a:ext uri="{FF2B5EF4-FFF2-40B4-BE49-F238E27FC236}">
-                <a16:creationId xmlns:a16="http://schemas.microsoft.com/office/drawing/2014/main" id="{CCBB783A-A3A4-4DB1-A040-FF16CEB5D609}"/>
-              </a:ext>
-            </a:extLst>
-          </p:cNvPr>
+          <p:cNvPr id="4" name="Footer Placeholder 3"/>
           <p:cNvSpPr>
             <a:spLocks noGrp="1"/>
           </p:cNvSpPr>
@@ -2343,13 +2113,7 @@
       </p:sp>
       <p:sp>
         <p:nvSpPr>
-          <p:cNvPr id="5" name="Espace réservé du numéro de diapositive 4">
-            <a:extLst>
-              <a:ext uri="{FF2B5EF4-FFF2-40B4-BE49-F238E27FC236}">
-                <a16:creationId xmlns:a16="http://schemas.microsoft.com/office/drawing/2014/main" id="{27301F84-F5D3-4CD2-9235-E761C6F8B27F}"/>
-              </a:ext>
-            </a:extLst>
-          </p:cNvPr>
+          <p:cNvPr id="5" name="Slide Number Placeholder 4"/>
           <p:cNvSpPr>
             <a:spLocks noGrp="1"/>
           </p:cNvSpPr>
@@ -2373,7 +2137,7 @@
     </p:spTree>
     <p:extLst>
       <p:ext uri="{BB962C8B-B14F-4D97-AF65-F5344CB8AC3E}">
-        <p14:creationId xmlns:p14="http://schemas.microsoft.com/office/powerpoint/2010/main" val="3911542224"/>
+        <p14:creationId xmlns:p14="http://schemas.microsoft.com/office/powerpoint/2010/main" val="2443636689"/>
       </p:ext>
     </p:extLst>
   </p:cSld>
@@ -2402,13 +2166,7 @@
       </p:grpSpPr>
       <p:sp>
         <p:nvSpPr>
-          <p:cNvPr id="2" name="Espace réservé de la date 1">
-            <a:extLst>
-              <a:ext uri="{FF2B5EF4-FFF2-40B4-BE49-F238E27FC236}">
-                <a16:creationId xmlns:a16="http://schemas.microsoft.com/office/drawing/2014/main" id="{DD815E3F-5B0E-4A3C-BCF4-8CC62F9E064D}"/>
-              </a:ext>
-            </a:extLst>
-          </p:cNvPr>
+          <p:cNvPr id="2" name="Date Placeholder 1"/>
           <p:cNvSpPr>
             <a:spLocks noGrp="1"/>
           </p:cNvSpPr>
@@ -2431,13 +2189,7 @@
       </p:sp>
       <p:sp>
         <p:nvSpPr>
-          <p:cNvPr id="3" name="Espace réservé du pied de page 2">
-            <a:extLst>
-              <a:ext uri="{FF2B5EF4-FFF2-40B4-BE49-F238E27FC236}">
-                <a16:creationId xmlns:a16="http://schemas.microsoft.com/office/drawing/2014/main" id="{9D83294E-048B-4BBD-AD75-BF2D61A373B7}"/>
-              </a:ext>
-            </a:extLst>
-          </p:cNvPr>
+          <p:cNvPr id="3" name="Footer Placeholder 2"/>
           <p:cNvSpPr>
             <a:spLocks noGrp="1"/>
           </p:cNvSpPr>
@@ -2456,13 +2208,7 @@
       </p:sp>
       <p:sp>
         <p:nvSpPr>
-          <p:cNvPr id="4" name="Espace réservé du numéro de diapositive 3">
-            <a:extLst>
-              <a:ext uri="{FF2B5EF4-FFF2-40B4-BE49-F238E27FC236}">
-                <a16:creationId xmlns:a16="http://schemas.microsoft.com/office/drawing/2014/main" id="{0154F2B0-EA7E-4D82-BD5B-023C862526CD}"/>
-              </a:ext>
-            </a:extLst>
-          </p:cNvPr>
+          <p:cNvPr id="4" name="Slide Number Placeholder 3"/>
           <p:cNvSpPr>
             <a:spLocks noGrp="1"/>
           </p:cNvSpPr>
@@ -2486,7 +2232,7 @@
     </p:spTree>
     <p:extLst>
       <p:ext uri="{BB962C8B-B14F-4D97-AF65-F5344CB8AC3E}">
-        <p14:creationId xmlns:p14="http://schemas.microsoft.com/office/powerpoint/2010/main" val="4282477555"/>
+        <p14:creationId xmlns:p14="http://schemas.microsoft.com/office/powerpoint/2010/main" val="3842621825"/>
       </p:ext>
     </p:extLst>
   </p:cSld>
@@ -2515,13 +2261,7 @@
       </p:grpSpPr>
       <p:sp>
         <p:nvSpPr>
-          <p:cNvPr id="2" name="Titre 1">
-            <a:extLst>
-              <a:ext uri="{FF2B5EF4-FFF2-40B4-BE49-F238E27FC236}">
-                <a16:creationId xmlns:a16="http://schemas.microsoft.com/office/drawing/2014/main" id="{1D0DDEC8-7080-4618-8115-9A60C04F59F9}"/>
-              </a:ext>
-            </a:extLst>
-          </p:cNvPr>
+          <p:cNvPr id="2" name="Title 1"/>
           <p:cNvSpPr>
             <a:spLocks noGrp="1"/>
           </p:cNvSpPr>
@@ -2547,18 +2287,13 @@
               <a:rPr lang="fr-FR"/>
               <a:t>Modifiez le style du titre</a:t>
             </a:r>
-          </a:p>
-        </p:txBody>
-      </p:sp>
-      <p:sp>
-        <p:nvSpPr>
-          <p:cNvPr id="3" name="Espace réservé du contenu 2">
-            <a:extLst>
-              <a:ext uri="{FF2B5EF4-FFF2-40B4-BE49-F238E27FC236}">
-                <a16:creationId xmlns:a16="http://schemas.microsoft.com/office/drawing/2014/main" id="{F9E0238E-BA5D-46D2-ACB5-FE3F2B8CF2E3}"/>
-              </a:ext>
-            </a:extLst>
-          </p:cNvPr>
+            <a:endParaRPr lang="en-US" dirty="0"/>
+          </a:p>
+        </p:txBody>
+      </p:sp>
+      <p:sp>
+        <p:nvSpPr>
+          <p:cNvPr id="3" name="Content Placeholder 2"/>
           <p:cNvSpPr>
             <a:spLocks noGrp="1"/>
           </p:cNvSpPr>
@@ -2637,18 +2372,13 @@
               <a:rPr lang="fr-FR"/>
               <a:t>Cinquième niveau</a:t>
             </a:r>
-          </a:p>
-        </p:txBody>
-      </p:sp>
-      <p:sp>
-        <p:nvSpPr>
-          <p:cNvPr id="4" name="Espace réservé du texte 3">
-            <a:extLst>
-              <a:ext uri="{FF2B5EF4-FFF2-40B4-BE49-F238E27FC236}">
-                <a16:creationId xmlns:a16="http://schemas.microsoft.com/office/drawing/2014/main" id="{27085EAF-DD4B-41B7-8DAE-53570C2EAE11}"/>
-              </a:ext>
-            </a:extLst>
-          </p:cNvPr>
+            <a:endParaRPr lang="en-US" dirty="0"/>
+          </a:p>
+        </p:txBody>
+      </p:sp>
+      <p:sp>
+        <p:nvSpPr>
+          <p:cNvPr id="4" name="Text Placeholder 3"/>
           <p:cNvSpPr>
             <a:spLocks noGrp="1"/>
           </p:cNvSpPr>
@@ -2713,13 +2443,7 @@
       </p:sp>
       <p:sp>
         <p:nvSpPr>
-          <p:cNvPr id="5" name="Espace réservé de la date 4">
-            <a:extLst>
-              <a:ext uri="{FF2B5EF4-FFF2-40B4-BE49-F238E27FC236}">
-                <a16:creationId xmlns:a16="http://schemas.microsoft.com/office/drawing/2014/main" id="{DECAEBE4-9418-4309-894C-C688520C715A}"/>
-              </a:ext>
-            </a:extLst>
-          </p:cNvPr>
+          <p:cNvPr id="5" name="Date Placeholder 4"/>
           <p:cNvSpPr>
             <a:spLocks noGrp="1"/>
           </p:cNvSpPr>
@@ -2742,13 +2466,7 @@
       </p:sp>
       <p:sp>
         <p:nvSpPr>
-          <p:cNvPr id="6" name="Espace réservé du pied de page 5">
-            <a:extLst>
-              <a:ext uri="{FF2B5EF4-FFF2-40B4-BE49-F238E27FC236}">
-                <a16:creationId xmlns:a16="http://schemas.microsoft.com/office/drawing/2014/main" id="{714A8B34-0C80-4003-A909-C2577949A4D1}"/>
-              </a:ext>
-            </a:extLst>
-          </p:cNvPr>
+          <p:cNvPr id="6" name="Footer Placeholder 5"/>
           <p:cNvSpPr>
             <a:spLocks noGrp="1"/>
           </p:cNvSpPr>
@@ -2767,13 +2485,7 @@
       </p:sp>
       <p:sp>
         <p:nvSpPr>
-          <p:cNvPr id="7" name="Espace réservé du numéro de diapositive 6">
-            <a:extLst>
-              <a:ext uri="{FF2B5EF4-FFF2-40B4-BE49-F238E27FC236}">
-                <a16:creationId xmlns:a16="http://schemas.microsoft.com/office/drawing/2014/main" id="{4EA8DB22-58EB-480C-9714-B45ACA488F8B}"/>
-              </a:ext>
-            </a:extLst>
-          </p:cNvPr>
+          <p:cNvPr id="7" name="Slide Number Placeholder 6"/>
           <p:cNvSpPr>
             <a:spLocks noGrp="1"/>
           </p:cNvSpPr>
@@ -2797,7 +2509,7 @@
     </p:spTree>
     <p:extLst>
       <p:ext uri="{BB962C8B-B14F-4D97-AF65-F5344CB8AC3E}">
-        <p14:creationId xmlns:p14="http://schemas.microsoft.com/office/powerpoint/2010/main" val="2055004857"/>
+        <p14:creationId xmlns:p14="http://schemas.microsoft.com/office/powerpoint/2010/main" val="3325063411"/>
       </p:ext>
     </p:extLst>
   </p:cSld>
@@ -2826,13 +2538,7 @@
       </p:grpSpPr>
       <p:sp>
         <p:nvSpPr>
-          <p:cNvPr id="2" name="Titre 1">
-            <a:extLst>
-              <a:ext uri="{FF2B5EF4-FFF2-40B4-BE49-F238E27FC236}">
-                <a16:creationId xmlns:a16="http://schemas.microsoft.com/office/drawing/2014/main" id="{966B6503-8B49-4D92-997F-285D52B5D10C}"/>
-              </a:ext>
-            </a:extLst>
-          </p:cNvPr>
+          <p:cNvPr id="2" name="Title 1"/>
           <p:cNvSpPr>
             <a:spLocks noGrp="1"/>
           </p:cNvSpPr>
@@ -2858,20 +2564,15 @@
               <a:rPr lang="fr-FR"/>
               <a:t>Modifiez le style du titre</a:t>
             </a:r>
-          </a:p>
-        </p:txBody>
-      </p:sp>
-      <p:sp>
-        <p:nvSpPr>
-          <p:cNvPr id="3" name="Espace réservé pour une image  2">
-            <a:extLst>
-              <a:ext uri="{FF2B5EF4-FFF2-40B4-BE49-F238E27FC236}">
-                <a16:creationId xmlns:a16="http://schemas.microsoft.com/office/drawing/2014/main" id="{A53DCD45-2B1B-47F5-9508-AD92BEF46A94}"/>
-              </a:ext>
-            </a:extLst>
-          </p:cNvPr>
-          <p:cNvSpPr>
-            <a:spLocks noGrp="1"/>
+            <a:endParaRPr lang="en-US" dirty="0"/>
+          </a:p>
+        </p:txBody>
+      </p:sp>
+      <p:sp>
+        <p:nvSpPr>
+          <p:cNvPr id="3" name="Picture Placeholder 2"/>
+          <p:cNvSpPr>
+            <a:spLocks noGrp="1" noChangeAspect="1"/>
           </p:cNvSpPr>
           <p:nvPr>
             <p:ph type="pic" idx="1"/>
@@ -2884,7 +2585,7 @@
           </a:xfrm>
         </p:spPr>
         <p:txBody>
-          <a:bodyPr/>
+          <a:bodyPr anchor="t"/>
           <a:lstStyle>
             <a:lvl1pPr marL="0" indent="0">
               <a:buNone/>
@@ -2924,19 +2625,17 @@
             </a:lvl9pPr>
           </a:lstStyle>
           <a:p>
-            <a:endParaRPr lang="fr-FR"/>
-          </a:p>
-        </p:txBody>
-      </p:sp>
-      <p:sp>
-        <p:nvSpPr>
-          <p:cNvPr id="4" name="Espace réservé du texte 3">
-            <a:extLst>
-              <a:ext uri="{FF2B5EF4-FFF2-40B4-BE49-F238E27FC236}">
-                <a16:creationId xmlns:a16="http://schemas.microsoft.com/office/drawing/2014/main" id="{DEE0F1AA-7482-4AE4-92D7-679CDD688E7C}"/>
-              </a:ext>
-            </a:extLst>
-          </p:cNvPr>
+            <a:r>
+              <a:rPr lang="fr-FR"/>
+              <a:t>Cliquez sur l'icône pour ajouter une image</a:t>
+            </a:r>
+            <a:endParaRPr lang="en-US" dirty="0"/>
+          </a:p>
+        </p:txBody>
+      </p:sp>
+      <p:sp>
+        <p:nvSpPr>
+          <p:cNvPr id="4" name="Text Placeholder 3"/>
           <p:cNvSpPr>
             <a:spLocks noGrp="1"/>
           </p:cNvSpPr>
@@ -3001,13 +2700,7 @@
       </p:sp>
       <p:sp>
         <p:nvSpPr>
-          <p:cNvPr id="5" name="Espace réservé de la date 4">
-            <a:extLst>
-              <a:ext uri="{FF2B5EF4-FFF2-40B4-BE49-F238E27FC236}">
-                <a16:creationId xmlns:a16="http://schemas.microsoft.com/office/drawing/2014/main" id="{0CF202D4-2720-449F-A5E6-FBDF3AA79EAA}"/>
-              </a:ext>
-            </a:extLst>
-          </p:cNvPr>
+          <p:cNvPr id="5" name="Date Placeholder 4"/>
           <p:cNvSpPr>
             <a:spLocks noGrp="1"/>
           </p:cNvSpPr>
@@ -3030,13 +2723,7 @@
       </p:sp>
       <p:sp>
         <p:nvSpPr>
-          <p:cNvPr id="6" name="Espace réservé du pied de page 5">
-            <a:extLst>
-              <a:ext uri="{FF2B5EF4-FFF2-40B4-BE49-F238E27FC236}">
-                <a16:creationId xmlns:a16="http://schemas.microsoft.com/office/drawing/2014/main" id="{2147215B-1B3A-47E4-8BD2-685A320303C3}"/>
-              </a:ext>
-            </a:extLst>
-          </p:cNvPr>
+          <p:cNvPr id="6" name="Footer Placeholder 5"/>
           <p:cNvSpPr>
             <a:spLocks noGrp="1"/>
           </p:cNvSpPr>
@@ -3055,13 +2742,7 @@
       </p:sp>
       <p:sp>
         <p:nvSpPr>
-          <p:cNvPr id="7" name="Espace réservé du numéro de diapositive 6">
-            <a:extLst>
-              <a:ext uri="{FF2B5EF4-FFF2-40B4-BE49-F238E27FC236}">
-                <a16:creationId xmlns:a16="http://schemas.microsoft.com/office/drawing/2014/main" id="{CAF15ACE-1B6C-4CD4-94B4-6DBA74A19731}"/>
-              </a:ext>
-            </a:extLst>
-          </p:cNvPr>
+          <p:cNvPr id="7" name="Slide Number Placeholder 6"/>
           <p:cNvSpPr>
             <a:spLocks noGrp="1"/>
           </p:cNvSpPr>
@@ -3085,7 +2766,7 @@
     </p:spTree>
     <p:extLst>
       <p:ext uri="{BB962C8B-B14F-4D97-AF65-F5344CB8AC3E}">
-        <p14:creationId xmlns:p14="http://schemas.microsoft.com/office/powerpoint/2010/main" val="3659754049"/>
+        <p14:creationId xmlns:p14="http://schemas.microsoft.com/office/powerpoint/2010/main" val="3965333119"/>
       </p:ext>
     </p:extLst>
   </p:cSld>
@@ -3119,13 +2800,7 @@
       </p:grpSpPr>
       <p:sp>
         <p:nvSpPr>
-          <p:cNvPr id="2" name="Espace réservé du titre 1">
-            <a:extLst>
-              <a:ext uri="{FF2B5EF4-FFF2-40B4-BE49-F238E27FC236}">
-                <a16:creationId xmlns:a16="http://schemas.microsoft.com/office/drawing/2014/main" id="{4010CF87-87CC-4AE8-9155-1D94CA379F80}"/>
-              </a:ext>
-            </a:extLst>
-          </p:cNvPr>
+          <p:cNvPr id="2" name="Title Placeholder 1"/>
           <p:cNvSpPr>
             <a:spLocks noGrp="1"/>
           </p:cNvSpPr>
@@ -3152,18 +2827,13 @@
               <a:rPr lang="fr-FR"/>
               <a:t>Modifiez le style du titre</a:t>
             </a:r>
-          </a:p>
-        </p:txBody>
-      </p:sp>
-      <p:sp>
-        <p:nvSpPr>
-          <p:cNvPr id="3" name="Espace réservé du texte 2">
-            <a:extLst>
-              <a:ext uri="{FF2B5EF4-FFF2-40B4-BE49-F238E27FC236}">
-                <a16:creationId xmlns:a16="http://schemas.microsoft.com/office/drawing/2014/main" id="{98B7FC33-99B8-46DF-9E10-77FAC6FB7162}"/>
-              </a:ext>
-            </a:extLst>
-          </p:cNvPr>
+            <a:endParaRPr lang="en-US" dirty="0"/>
+          </a:p>
+        </p:txBody>
+      </p:sp>
+      <p:sp>
+        <p:nvSpPr>
+          <p:cNvPr id="3" name="Text Placeholder 2"/>
           <p:cNvSpPr>
             <a:spLocks noGrp="1"/>
           </p:cNvSpPr>
@@ -3219,18 +2889,13 @@
               <a:rPr lang="fr-FR"/>
               <a:t>Cinquième niveau</a:t>
             </a:r>
-          </a:p>
-        </p:txBody>
-      </p:sp>
-      <p:sp>
-        <p:nvSpPr>
-          <p:cNvPr id="4" name="Espace réservé de la date 3">
-            <a:extLst>
-              <a:ext uri="{FF2B5EF4-FFF2-40B4-BE49-F238E27FC236}">
-                <a16:creationId xmlns:a16="http://schemas.microsoft.com/office/drawing/2014/main" id="{7BB9B2B5-769B-4343-A0F4-530DD8EA8A92}"/>
-              </a:ext>
-            </a:extLst>
-          </p:cNvPr>
+            <a:endParaRPr lang="en-US" dirty="0"/>
+          </a:p>
+        </p:txBody>
+      </p:sp>
+      <p:sp>
+        <p:nvSpPr>
+          <p:cNvPr id="4" name="Date Placeholder 3"/>
           <p:cNvSpPr>
             <a:spLocks noGrp="1"/>
           </p:cNvSpPr>
@@ -3271,13 +2936,7 @@
       </p:sp>
       <p:sp>
         <p:nvSpPr>
-          <p:cNvPr id="5" name="Espace réservé du pied de page 4">
-            <a:extLst>
-              <a:ext uri="{FF2B5EF4-FFF2-40B4-BE49-F238E27FC236}">
-                <a16:creationId xmlns:a16="http://schemas.microsoft.com/office/drawing/2014/main" id="{D543FA4A-50DC-4237-BEE3-AFAB9FF24C87}"/>
-              </a:ext>
-            </a:extLst>
-          </p:cNvPr>
+          <p:cNvPr id="5" name="Footer Placeholder 4"/>
           <p:cNvSpPr>
             <a:spLocks noGrp="1"/>
           </p:cNvSpPr>
@@ -3314,13 +2973,7 @@
       </p:sp>
       <p:sp>
         <p:nvSpPr>
-          <p:cNvPr id="6" name="Espace réservé du numéro de diapositive 5">
-            <a:extLst>
-              <a:ext uri="{FF2B5EF4-FFF2-40B4-BE49-F238E27FC236}">
-                <a16:creationId xmlns:a16="http://schemas.microsoft.com/office/drawing/2014/main" id="{1D0FB4BF-9CF0-4B12-8527-01042CEC161F}"/>
-              </a:ext>
-            </a:extLst>
-          </p:cNvPr>
+          <p:cNvPr id="6" name="Slide Number Placeholder 5"/>
           <p:cNvSpPr>
             <a:spLocks noGrp="1"/>
           </p:cNvSpPr>
@@ -3362,23 +3015,23 @@
     </p:spTree>
     <p:extLst>
       <p:ext uri="{BB962C8B-B14F-4D97-AF65-F5344CB8AC3E}">
-        <p14:creationId xmlns:p14="http://schemas.microsoft.com/office/powerpoint/2010/main" val="4039315440"/>
+        <p14:creationId xmlns:p14="http://schemas.microsoft.com/office/powerpoint/2010/main" val="2998743137"/>
       </p:ext>
     </p:extLst>
   </p:cSld>
   <p:clrMap bg1="lt1" tx1="dk1" bg2="lt2" tx2="dk2" accent1="accent1" accent2="accent2" accent3="accent3" accent4="accent4" accent5="accent5" accent6="accent6" hlink="hlink" folHlink="folHlink"/>
   <p:sldLayoutIdLst>
-    <p:sldLayoutId id="2147483776" r:id="rId1"/>
-    <p:sldLayoutId id="2147483777" r:id="rId2"/>
-    <p:sldLayoutId id="2147483778" r:id="rId3"/>
-    <p:sldLayoutId id="2147483779" r:id="rId4"/>
-    <p:sldLayoutId id="2147483780" r:id="rId5"/>
-    <p:sldLayoutId id="2147483781" r:id="rId6"/>
-    <p:sldLayoutId id="2147483782" r:id="rId7"/>
-    <p:sldLayoutId id="2147483783" r:id="rId8"/>
-    <p:sldLayoutId id="2147483784" r:id="rId9"/>
-    <p:sldLayoutId id="2147483785" r:id="rId10"/>
-    <p:sldLayoutId id="2147483786" r:id="rId11"/>
+    <p:sldLayoutId id="2147483788" r:id="rId1"/>
+    <p:sldLayoutId id="2147483789" r:id="rId2"/>
+    <p:sldLayoutId id="2147483790" r:id="rId3"/>
+    <p:sldLayoutId id="2147483791" r:id="rId4"/>
+    <p:sldLayoutId id="2147483792" r:id="rId5"/>
+    <p:sldLayoutId id="2147483793" r:id="rId6"/>
+    <p:sldLayoutId id="2147483794" r:id="rId7"/>
+    <p:sldLayoutId id="2147483795" r:id="rId8"/>
+    <p:sldLayoutId id="2147483796" r:id="rId9"/>
+    <p:sldLayoutId id="2147483797" r:id="rId10"/>
+    <p:sldLayoutId id="2147483798" r:id="rId11"/>
   </p:sldLayoutIdLst>
   <p:hf hdr="0" ftr="0" dt="0"/>
   <p:txStyles>
@@ -3567,7 +3220,7 @@
     </p:bodyStyle>
     <p:otherStyle>
       <a:defPPr>
-        <a:defRPr lang="fr-FR"/>
+        <a:defRPr lang="en-US"/>
       </a:defPPr>
       <a:lvl1pPr marL="0" algn="l" defTabSz="914400" rtl="0" eaLnBrk="1" latinLnBrk="0" hangingPunct="1">
         <a:defRPr sz="1800" kern="1200">
@@ -4130,6 +3783,43 @@
           </a:p>
         </p:txBody>
       </p:sp>
+      <p:sp>
+        <p:nvSpPr>
+          <p:cNvPr id="7" name="Espace réservé du numéro de diapositive 6">
+            <a:extLst>
+              <a:ext uri="{FF2B5EF4-FFF2-40B4-BE49-F238E27FC236}">
+                <a16:creationId xmlns:a16="http://schemas.microsoft.com/office/drawing/2014/main" id="{2F61BFC2-19B8-4188-9ED4-3334C6A246EF}"/>
+              </a:ext>
+            </a:extLst>
+          </p:cNvPr>
+          <p:cNvSpPr>
+            <a:spLocks noGrp="1"/>
+          </p:cNvSpPr>
+          <p:nvPr>
+            <p:ph type="sldNum" sz="quarter" idx="12"/>
+          </p:nvPr>
+        </p:nvSpPr>
+        <p:spPr/>
+        <p:txBody>
+          <a:bodyPr/>
+          <a:lstStyle/>
+          <a:p>
+            <a:fld id="{3A98EE3D-8CD1-4C3F-BD1C-C98C9596463C}" type="slidenum">
+              <a:rPr lang="en-US" smtClean="0">
+                <a:solidFill>
+                  <a:schemeClr val="bg1"/>
+                </a:solidFill>
+              </a:rPr>
+              <a:t>2</a:t>
+            </a:fld>
+            <a:endParaRPr lang="en-US" dirty="0">
+              <a:solidFill>
+                <a:schemeClr val="bg1"/>
+              </a:solidFill>
+            </a:endParaRPr>
+          </a:p>
+        </p:txBody>
+      </p:sp>
       <p:cxnSp>
         <p:nvCxnSpPr>
           <p:cNvPr id="5" name="Connecteur droit 4">
@@ -4173,43 +3863,6 @@
           </a:fontRef>
         </p:style>
       </p:cxnSp>
-      <p:sp>
-        <p:nvSpPr>
-          <p:cNvPr id="7" name="Espace réservé du numéro de diapositive 6">
-            <a:extLst>
-              <a:ext uri="{FF2B5EF4-FFF2-40B4-BE49-F238E27FC236}">
-                <a16:creationId xmlns:a16="http://schemas.microsoft.com/office/drawing/2014/main" id="{2F61BFC2-19B8-4188-9ED4-3334C6A246EF}"/>
-              </a:ext>
-            </a:extLst>
-          </p:cNvPr>
-          <p:cNvSpPr>
-            <a:spLocks noGrp="1"/>
-          </p:cNvSpPr>
-          <p:nvPr>
-            <p:ph type="sldNum" sz="quarter" idx="12"/>
-          </p:nvPr>
-        </p:nvSpPr>
-        <p:spPr/>
-        <p:txBody>
-          <a:bodyPr/>
-          <a:lstStyle/>
-          <a:p>
-            <a:fld id="{3A98EE3D-8CD1-4C3F-BD1C-C98C9596463C}" type="slidenum">
-              <a:rPr lang="en-US" smtClean="0">
-                <a:solidFill>
-                  <a:schemeClr val="bg1"/>
-                </a:solidFill>
-              </a:rPr>
-              <a:t>2</a:t>
-            </a:fld>
-            <a:endParaRPr lang="en-US" dirty="0">
-              <a:solidFill>
-                <a:schemeClr val="bg1"/>
-              </a:solidFill>
-            </a:endParaRPr>
-          </a:p>
-        </p:txBody>
-      </p:sp>
     </p:spTree>
     <p:extLst>
       <p:ext uri="{BB962C8B-B14F-4D97-AF65-F5344CB8AC3E}">
@@ -4414,6 +4067,43 @@
               </a:rPr>
               <a:t>Etape 4</a:t>
             </a:r>
+          </a:p>
+        </p:txBody>
+      </p:sp>
+      <p:sp>
+        <p:nvSpPr>
+          <p:cNvPr id="13" name="Espace réservé du numéro de diapositive 12">
+            <a:extLst>
+              <a:ext uri="{FF2B5EF4-FFF2-40B4-BE49-F238E27FC236}">
+                <a16:creationId xmlns:a16="http://schemas.microsoft.com/office/drawing/2014/main" id="{673D0F55-FA62-4EB3-AEA0-3E41A7899374}"/>
+              </a:ext>
+            </a:extLst>
+          </p:cNvPr>
+          <p:cNvSpPr>
+            <a:spLocks noGrp="1"/>
+          </p:cNvSpPr>
+          <p:nvPr>
+            <p:ph type="sldNum" sz="quarter" idx="12"/>
+          </p:nvPr>
+        </p:nvSpPr>
+        <p:spPr/>
+        <p:txBody>
+          <a:bodyPr/>
+          <a:lstStyle/>
+          <a:p>
+            <a:fld id="{3A98EE3D-8CD1-4C3F-BD1C-C98C9596463C}" type="slidenum">
+              <a:rPr lang="en-US" smtClean="0">
+                <a:solidFill>
+                  <a:schemeClr val="bg1"/>
+                </a:solidFill>
+              </a:rPr>
+              <a:t>3</a:t>
+            </a:fld>
+            <a:endParaRPr lang="en-US" dirty="0">
+              <a:solidFill>
+                <a:schemeClr val="bg1"/>
+              </a:solidFill>
+            </a:endParaRPr>
           </a:p>
         </p:txBody>
       </p:sp>
@@ -4655,7 +4345,7 @@
           <a:lstStyle/>
           <a:p>
             <a:pPr algn="ctr"/>
-            <a:endParaRPr lang="fr-FR"/>
+            <a:endParaRPr lang="fr-FR" dirty="0"/>
           </a:p>
         </p:txBody>
       </p:sp>
@@ -4697,43 +4387,6 @@
               </a:rPr>
               <a:t>Excel</a:t>
             </a:r>
-          </a:p>
-        </p:txBody>
-      </p:sp>
-      <p:sp>
-        <p:nvSpPr>
-          <p:cNvPr id="13" name="Espace réservé du numéro de diapositive 12">
-            <a:extLst>
-              <a:ext uri="{FF2B5EF4-FFF2-40B4-BE49-F238E27FC236}">
-                <a16:creationId xmlns:a16="http://schemas.microsoft.com/office/drawing/2014/main" id="{673D0F55-FA62-4EB3-AEA0-3E41A7899374}"/>
-              </a:ext>
-            </a:extLst>
-          </p:cNvPr>
-          <p:cNvSpPr>
-            <a:spLocks noGrp="1"/>
-          </p:cNvSpPr>
-          <p:nvPr>
-            <p:ph type="sldNum" sz="quarter" idx="12"/>
-          </p:nvPr>
-        </p:nvSpPr>
-        <p:spPr/>
-        <p:txBody>
-          <a:bodyPr/>
-          <a:lstStyle/>
-          <a:p>
-            <a:fld id="{3A98EE3D-8CD1-4C3F-BD1C-C98C9596463C}" type="slidenum">
-              <a:rPr lang="en-US" smtClean="0">
-                <a:solidFill>
-                  <a:schemeClr val="bg1"/>
-                </a:solidFill>
-              </a:rPr>
-              <a:t>3</a:t>
-            </a:fld>
-            <a:endParaRPr lang="en-US" dirty="0">
-              <a:solidFill>
-                <a:schemeClr val="bg1"/>
-              </a:solidFill>
-            </a:endParaRPr>
           </a:p>
         </p:txBody>
       </p:sp>
@@ -4825,10 +4478,10 @@
       </p:sp>
       <p:sp>
         <p:nvSpPr>
-          <p:cNvPr id="3" name="Espace réservé du contenu 2">
+          <p:cNvPr id="4" name="Espace réservé du numéro de diapositive 3">
             <a:extLst>
               <a:ext uri="{FF2B5EF4-FFF2-40B4-BE49-F238E27FC236}">
-                <a16:creationId xmlns:a16="http://schemas.microsoft.com/office/drawing/2014/main" id="{FC447053-0E22-4A33-8DB6-6CC29C3A1B0B}"/>
+                <a16:creationId xmlns:a16="http://schemas.microsoft.com/office/drawing/2014/main" id="{01507C7A-AEFC-429F-BCED-784B563487EC}"/>
               </a:ext>
             </a:extLst>
           </p:cNvPr>
@@ -4836,29 +4489,26 @@
             <a:spLocks noGrp="1"/>
           </p:cNvSpPr>
           <p:nvPr>
-            <p:ph idx="1"/>
-          </p:nvPr>
-        </p:nvSpPr>
-        <p:spPr>
-          <a:xfrm>
-            <a:off x="838200" y="1921079"/>
-            <a:ext cx="10515600" cy="4571796"/>
-          </a:xfrm>
-        </p:spPr>
-        <p:txBody>
-          <a:bodyPr>
-            <a:normAutofit/>
-          </a:bodyPr>
-          <a:lstStyle/>
-          <a:p>
-            <a:pPr marL="0" indent="0" algn="ctr">
-              <a:buNone/>
-            </a:pPr>
-            <a:endParaRPr lang="fr-FR" dirty="0">
+            <p:ph type="sldNum" sz="quarter" idx="12"/>
+          </p:nvPr>
+        </p:nvSpPr>
+        <p:spPr/>
+        <p:txBody>
+          <a:bodyPr/>
+          <a:lstStyle/>
+          <a:p>
+            <a:fld id="{3A98EE3D-8CD1-4C3F-BD1C-C98C9596463C}" type="slidenum">
+              <a:rPr lang="en-US" smtClean="0">
+                <a:solidFill>
+                  <a:schemeClr val="bg1"/>
+                </a:solidFill>
+              </a:rPr>
+              <a:t>4</a:t>
+            </a:fld>
+            <a:endParaRPr lang="en-US" dirty="0">
               <a:solidFill>
                 <a:schemeClr val="bg1"/>
               </a:solidFill>
-              <a:latin typeface="Abadi Extra Light" panose="020B0204020104020204" pitchFamily="34" charset="0"/>
             </a:endParaRPr>
           </a:p>
         </p:txBody>
@@ -4906,40 +4556,82 @@
           </a:fontRef>
         </p:style>
       </p:cxnSp>
-      <p:sp>
-        <p:nvSpPr>
-          <p:cNvPr id="4" name="Espace réservé du numéro de diapositive 3">
+      <p:pic>
+        <p:nvPicPr>
+          <p:cNvPr id="6" name="Image 5">
             <a:extLst>
               <a:ext uri="{FF2B5EF4-FFF2-40B4-BE49-F238E27FC236}">
-                <a16:creationId xmlns:a16="http://schemas.microsoft.com/office/drawing/2014/main" id="{01507C7A-AEFC-429F-BCED-784B563487EC}"/>
+                <a16:creationId xmlns:a16="http://schemas.microsoft.com/office/drawing/2014/main" id="{888488EA-7278-4E22-AD86-A9218DAD83B7}"/>
               </a:ext>
             </a:extLst>
           </p:cNvPr>
-          <p:cNvSpPr>
-            <a:spLocks noGrp="1"/>
-          </p:cNvSpPr>
-          <p:nvPr>
-            <p:ph type="sldNum" sz="quarter" idx="12"/>
-          </p:nvPr>
-        </p:nvSpPr>
-        <p:spPr/>
-        <p:txBody>
-          <a:bodyPr/>
-          <a:lstStyle/>
-          <a:p>
-            <a:fld id="{3A98EE3D-8CD1-4C3F-BD1C-C98C9596463C}" type="slidenum">
-              <a:rPr lang="en-US" smtClean="0">
+          <p:cNvPicPr/>
+          <p:nvPr/>
+        </p:nvPicPr>
+        <p:blipFill>
+          <a:blip r:embed="rId2">
+            <a:extLst>
+              <a:ext uri="{28A0092B-C50C-407E-A947-70E740481C1C}">
+                <a14:useLocalDpi xmlns:a14="http://schemas.microsoft.com/office/drawing/2010/main" val="0"/>
+              </a:ext>
+            </a:extLst>
+          </a:blip>
+          <a:srcRect/>
+          <a:stretch>
+            <a:fillRect/>
+          </a:stretch>
+        </p:blipFill>
+        <p:spPr bwMode="auto">
+          <a:xfrm>
+            <a:off x="2168710" y="2286151"/>
+            <a:ext cx="7854579" cy="4070199"/>
+          </a:xfrm>
+          <a:prstGeom prst="rect">
+            <a:avLst/>
+          </a:prstGeom>
+          <a:noFill/>
+          <a:ln>
+            <a:noFill/>
+          </a:ln>
+        </p:spPr>
+      </p:pic>
+      <p:sp>
+        <p:nvSpPr>
+          <p:cNvPr id="9" name="Rectangle 8">
+            <a:extLst>
+              <a:ext uri="{FF2B5EF4-FFF2-40B4-BE49-F238E27FC236}">
+                <a16:creationId xmlns:a16="http://schemas.microsoft.com/office/drawing/2014/main" id="{EA610BED-C018-431E-9CDB-94608322D439}"/>
+              </a:ext>
+            </a:extLst>
+          </p:cNvPr>
+          <p:cNvSpPr/>
+          <p:nvPr/>
+        </p:nvSpPr>
+        <p:spPr>
+          <a:xfrm>
+            <a:off x="5374433" y="1550085"/>
+            <a:ext cx="1184940" cy="646331"/>
+          </a:xfrm>
+          <a:prstGeom prst="rect">
+            <a:avLst/>
+          </a:prstGeom>
+        </p:spPr>
+        <p:txBody>
+          <a:bodyPr wrap="none">
+            <a:spAutoFit/>
+          </a:bodyPr>
+          <a:lstStyle/>
+          <a:p>
+            <a:pPr algn="ctr"/>
+            <a:r>
+              <a:rPr lang="fr-FR" sz="3600" dirty="0">
                 <a:solidFill>
                   <a:schemeClr val="bg1"/>
                 </a:solidFill>
+                <a:latin typeface="Abadi Extra Light" panose="020B0204020104020204" pitchFamily="34" charset="0"/>
               </a:rPr>
-              <a:t>4</a:t>
-            </a:fld>
-            <a:endParaRPr lang="en-US" dirty="0">
-              <a:solidFill>
-                <a:schemeClr val="bg1"/>
-              </a:solidFill>
-            </a:endParaRPr>
+              <a:t>Avant</a:t>
+            </a:r>
           </a:p>
         </p:txBody>
       </p:sp>
@@ -4957,6 +4649,282 @@
 </file>
 
 <file path=ppt/slides/slide5.xml><?xml version="1.0" encoding="utf-8"?>
+<p:sld xmlns:a="http://schemas.openxmlformats.org/drawingml/2006/main" xmlns:r="http://schemas.openxmlformats.org/officeDocument/2006/relationships" xmlns:p="http://schemas.openxmlformats.org/presentationml/2006/main">
+  <p:cSld>
+    <p:spTree>
+      <p:nvGrpSpPr>
+        <p:cNvPr id="1" name=""/>
+        <p:cNvGrpSpPr/>
+        <p:nvPr/>
+      </p:nvGrpSpPr>
+      <p:grpSpPr>
+        <a:xfrm>
+          <a:off x="0" y="0"/>
+          <a:ext cx="0" cy="0"/>
+          <a:chOff x="0" y="0"/>
+          <a:chExt cx="0" cy="0"/>
+        </a:xfrm>
+      </p:grpSpPr>
+      <p:pic>
+        <p:nvPicPr>
+          <p:cNvPr id="3" name="Image 2">
+            <a:extLst>
+              <a:ext uri="{FF2B5EF4-FFF2-40B4-BE49-F238E27FC236}">
+                <a16:creationId xmlns:a16="http://schemas.microsoft.com/office/drawing/2014/main" id="{621DDB1F-2561-47A3-82D1-942E0411059B}"/>
+              </a:ext>
+            </a:extLst>
+          </p:cNvPr>
+          <p:cNvPicPr>
+            <a:picLocks noChangeAspect="1"/>
+          </p:cNvPicPr>
+          <p:nvPr/>
+        </p:nvPicPr>
+        <p:blipFill>
+          <a:blip r:embed="rId2"/>
+          <a:stretch>
+            <a:fillRect/>
+          </a:stretch>
+        </p:blipFill>
+        <p:spPr>
+          <a:xfrm>
+            <a:off x="0" y="-9447"/>
+            <a:ext cx="12192000" cy="6876893"/>
+          </a:xfrm>
+          <a:prstGeom prst="rect">
+            <a:avLst/>
+          </a:prstGeom>
+        </p:spPr>
+      </p:pic>
+      <p:sp>
+        <p:nvSpPr>
+          <p:cNvPr id="2" name="Titre 1">
+            <a:extLst>
+              <a:ext uri="{FF2B5EF4-FFF2-40B4-BE49-F238E27FC236}">
+                <a16:creationId xmlns:a16="http://schemas.microsoft.com/office/drawing/2014/main" id="{D14F7933-181C-4296-A745-4D8519998823}"/>
+              </a:ext>
+            </a:extLst>
+          </p:cNvPr>
+          <p:cNvSpPr>
+            <a:spLocks noGrp="1"/>
+          </p:cNvSpPr>
+          <p:nvPr>
+            <p:ph type="title"/>
+          </p:nvPr>
+        </p:nvSpPr>
+        <p:spPr/>
+        <p:txBody>
+          <a:bodyPr>
+            <a:normAutofit/>
+          </a:bodyPr>
+          <a:lstStyle/>
+          <a:p>
+            <a:r>
+              <a:rPr lang="fr-FR" sz="4800" cap="all" dirty="0">
+                <a:solidFill>
+                  <a:schemeClr val="bg1"/>
+                </a:solidFill>
+                <a:latin typeface="Abadi Extra Light" panose="020B0204020104020204" pitchFamily="34" charset="0"/>
+                <a:cs typeface="Aparajita" panose="02020603050405020304" pitchFamily="18" charset="0"/>
+              </a:rPr>
+              <a:t>Changements graphiques</a:t>
+            </a:r>
+          </a:p>
+        </p:txBody>
+      </p:sp>
+      <p:sp>
+        <p:nvSpPr>
+          <p:cNvPr id="4" name="Espace réservé du numéro de diapositive 3">
+            <a:extLst>
+              <a:ext uri="{FF2B5EF4-FFF2-40B4-BE49-F238E27FC236}">
+                <a16:creationId xmlns:a16="http://schemas.microsoft.com/office/drawing/2014/main" id="{01507C7A-AEFC-429F-BCED-784B563487EC}"/>
+              </a:ext>
+            </a:extLst>
+          </p:cNvPr>
+          <p:cNvSpPr>
+            <a:spLocks noGrp="1"/>
+          </p:cNvSpPr>
+          <p:nvPr>
+            <p:ph type="sldNum" sz="quarter" idx="12"/>
+          </p:nvPr>
+        </p:nvSpPr>
+        <p:spPr/>
+        <p:txBody>
+          <a:bodyPr/>
+          <a:lstStyle/>
+          <a:p>
+            <a:fld id="{3A98EE3D-8CD1-4C3F-BD1C-C98C9596463C}" type="slidenum">
+              <a:rPr lang="en-US" smtClean="0">
+                <a:solidFill>
+                  <a:schemeClr val="bg1"/>
+                </a:solidFill>
+              </a:rPr>
+              <a:t>5</a:t>
+            </a:fld>
+            <a:endParaRPr lang="en-US" dirty="0">
+              <a:solidFill>
+                <a:schemeClr val="bg1"/>
+              </a:solidFill>
+            </a:endParaRPr>
+          </a:p>
+        </p:txBody>
+      </p:sp>
+      <p:cxnSp>
+        <p:nvCxnSpPr>
+          <p:cNvPr id="5" name="Connecteur droit 4">
+            <a:extLst>
+              <a:ext uri="{FF2B5EF4-FFF2-40B4-BE49-F238E27FC236}">
+                <a16:creationId xmlns:a16="http://schemas.microsoft.com/office/drawing/2014/main" id="{D0711901-2FA1-404A-8358-9552E5B2A907}"/>
+              </a:ext>
+            </a:extLst>
+          </p:cNvPr>
+          <p:cNvCxnSpPr>
+            <a:cxnSpLocks/>
+          </p:cNvCxnSpPr>
+          <p:nvPr/>
+        </p:nvCxnSpPr>
+        <p:spPr>
+          <a:xfrm>
+            <a:off x="942392" y="1418252"/>
+            <a:ext cx="8864082" cy="0"/>
+          </a:xfrm>
+          <a:prstGeom prst="line">
+            <a:avLst/>
+          </a:prstGeom>
+          <a:ln w="41275">
+            <a:solidFill>
+              <a:schemeClr val="bg1"/>
+            </a:solidFill>
+          </a:ln>
+        </p:spPr>
+        <p:style>
+          <a:lnRef idx="1">
+            <a:schemeClr val="accent1"/>
+          </a:lnRef>
+          <a:fillRef idx="0">
+            <a:schemeClr val="accent1"/>
+          </a:fillRef>
+          <a:effectRef idx="0">
+            <a:schemeClr val="accent1"/>
+          </a:effectRef>
+          <a:fontRef idx="minor">
+            <a:schemeClr val="tx1"/>
+          </a:fontRef>
+        </p:style>
+      </p:cxnSp>
+      <p:sp>
+        <p:nvSpPr>
+          <p:cNvPr id="7" name="Rectangle 6">
+            <a:extLst>
+              <a:ext uri="{FF2B5EF4-FFF2-40B4-BE49-F238E27FC236}">
+                <a16:creationId xmlns:a16="http://schemas.microsoft.com/office/drawing/2014/main" id="{0651E00D-32BC-4BC3-911B-83B654B499B8}"/>
+              </a:ext>
+            </a:extLst>
+          </p:cNvPr>
+          <p:cNvSpPr/>
+          <p:nvPr/>
+        </p:nvSpPr>
+        <p:spPr>
+          <a:xfrm>
+            <a:off x="5356255" y="1550085"/>
+            <a:ext cx="1221296" cy="646331"/>
+          </a:xfrm>
+          <a:prstGeom prst="rect">
+            <a:avLst/>
+          </a:prstGeom>
+        </p:spPr>
+        <p:txBody>
+          <a:bodyPr wrap="none">
+            <a:spAutoFit/>
+          </a:bodyPr>
+          <a:lstStyle/>
+          <a:p>
+            <a:pPr algn="ctr"/>
+            <a:r>
+              <a:rPr lang="fr-FR" sz="3600" dirty="0">
+                <a:solidFill>
+                  <a:schemeClr val="bg1"/>
+                </a:solidFill>
+                <a:latin typeface="Abadi Extra Light" panose="020B0204020104020204" pitchFamily="34" charset="0"/>
+              </a:rPr>
+              <a:t>Après</a:t>
+            </a:r>
+          </a:p>
+        </p:txBody>
+      </p:sp>
+      <p:pic>
+        <p:nvPicPr>
+          <p:cNvPr id="9" name="Image 8" descr="Une image contenant capture d’écran&#10;&#10;Description générée automatiquement">
+            <a:extLst>
+              <a:ext uri="{FF2B5EF4-FFF2-40B4-BE49-F238E27FC236}">
+                <a16:creationId xmlns:a16="http://schemas.microsoft.com/office/drawing/2014/main" id="{B91A607A-ED07-440D-98A3-CD6DE1AED91A}"/>
+              </a:ext>
+            </a:extLst>
+          </p:cNvPr>
+          <p:cNvPicPr>
+            <a:picLocks noChangeAspect="1"/>
+          </p:cNvPicPr>
+          <p:nvPr/>
+        </p:nvPicPr>
+        <p:blipFill>
+          <a:blip r:embed="rId3"/>
+          <a:stretch>
+            <a:fillRect/>
+          </a:stretch>
+        </p:blipFill>
+        <p:spPr>
+          <a:xfrm>
+            <a:off x="335560" y="2564567"/>
+            <a:ext cx="6096000" cy="3429000"/>
+          </a:xfrm>
+          <a:prstGeom prst="rect">
+            <a:avLst/>
+          </a:prstGeom>
+        </p:spPr>
+      </p:pic>
+      <p:pic>
+        <p:nvPicPr>
+          <p:cNvPr id="11" name="Image 10" descr="Une image contenant capture d’écran&#10;&#10;Description générée automatiquement">
+            <a:extLst>
+              <a:ext uri="{FF2B5EF4-FFF2-40B4-BE49-F238E27FC236}">
+                <a16:creationId xmlns:a16="http://schemas.microsoft.com/office/drawing/2014/main" id="{1FE41F89-3CCA-48FE-A9E8-AC893171906D}"/>
+              </a:ext>
+            </a:extLst>
+          </p:cNvPr>
+          <p:cNvPicPr>
+            <a:picLocks noChangeAspect="1"/>
+          </p:cNvPicPr>
+          <p:nvPr/>
+        </p:nvPicPr>
+        <p:blipFill>
+          <a:blip r:embed="rId4"/>
+          <a:stretch>
+            <a:fillRect/>
+          </a:stretch>
+        </p:blipFill>
+        <p:spPr>
+          <a:xfrm>
+            <a:off x="6920718" y="2819486"/>
+            <a:ext cx="4731790" cy="2911160"/>
+          </a:xfrm>
+          <a:prstGeom prst="rect">
+            <a:avLst/>
+          </a:prstGeom>
+        </p:spPr>
+      </p:pic>
+    </p:spTree>
+    <p:extLst>
+      <p:ext uri="{BB962C8B-B14F-4D97-AF65-F5344CB8AC3E}">
+        <p14:creationId xmlns:p14="http://schemas.microsoft.com/office/powerpoint/2010/main" val="3724820569"/>
+      </p:ext>
+    </p:extLst>
+  </p:cSld>
+  <p:clrMapOvr>
+    <a:masterClrMapping/>
+  </p:clrMapOvr>
+</p:sld>
+</file>
+
+<file path=ppt/slides/slide6.xml><?xml version="1.0" encoding="utf-8"?>
 <p:sld xmlns:a="http://schemas.openxmlformats.org/drawingml/2006/main" xmlns:r="http://schemas.openxmlformats.org/officeDocument/2006/relationships" xmlns:p="http://schemas.openxmlformats.org/presentationml/2006/main">
   <p:cSld>
     <p:bg>
@@ -5058,6 +5026,43 @@
           </a:xfrm>
         </p:spPr>
       </p:pic>
+      <p:sp>
+        <p:nvSpPr>
+          <p:cNvPr id="9" name="Espace réservé du numéro de diapositive 8">
+            <a:extLst>
+              <a:ext uri="{FF2B5EF4-FFF2-40B4-BE49-F238E27FC236}">
+                <a16:creationId xmlns:a16="http://schemas.microsoft.com/office/drawing/2014/main" id="{ADB6BA74-A6B8-4F1B-B1A8-D170A24C38FD}"/>
+              </a:ext>
+            </a:extLst>
+          </p:cNvPr>
+          <p:cNvSpPr>
+            <a:spLocks noGrp="1"/>
+          </p:cNvSpPr>
+          <p:nvPr>
+            <p:ph type="sldNum" sz="quarter" idx="12"/>
+          </p:nvPr>
+        </p:nvSpPr>
+        <p:spPr/>
+        <p:txBody>
+          <a:bodyPr/>
+          <a:lstStyle/>
+          <a:p>
+            <a:fld id="{3A98EE3D-8CD1-4C3F-BD1C-C98C9596463C}" type="slidenum">
+              <a:rPr lang="en-US" smtClean="0">
+                <a:solidFill>
+                  <a:schemeClr val="bg1"/>
+                </a:solidFill>
+              </a:rPr>
+              <a:t>6</a:t>
+            </a:fld>
+            <a:endParaRPr lang="en-US" dirty="0">
+              <a:solidFill>
+                <a:schemeClr val="bg1"/>
+              </a:solidFill>
+            </a:endParaRPr>
+          </a:p>
+        </p:txBody>
+      </p:sp>
       <p:cxnSp>
         <p:nvCxnSpPr>
           <p:cNvPr id="5" name="Connecteur droit 4">
@@ -5131,256 +5136,10 @@
           </a:prstGeom>
         </p:spPr>
       </p:pic>
-      <p:sp>
-        <p:nvSpPr>
-          <p:cNvPr id="9" name="Espace réservé du numéro de diapositive 8">
-            <a:extLst>
-              <a:ext uri="{FF2B5EF4-FFF2-40B4-BE49-F238E27FC236}">
-                <a16:creationId xmlns:a16="http://schemas.microsoft.com/office/drawing/2014/main" id="{ADB6BA74-A6B8-4F1B-B1A8-D170A24C38FD}"/>
-              </a:ext>
-            </a:extLst>
-          </p:cNvPr>
-          <p:cNvSpPr>
-            <a:spLocks noGrp="1"/>
-          </p:cNvSpPr>
-          <p:nvPr>
-            <p:ph type="sldNum" sz="quarter" idx="12"/>
-          </p:nvPr>
-        </p:nvSpPr>
-        <p:spPr/>
-        <p:txBody>
-          <a:bodyPr/>
-          <a:lstStyle/>
-          <a:p>
-            <a:fld id="{3A98EE3D-8CD1-4C3F-BD1C-C98C9596463C}" type="slidenum">
-              <a:rPr lang="en-US" smtClean="0">
-                <a:solidFill>
-                  <a:schemeClr val="bg1"/>
-                </a:solidFill>
-              </a:rPr>
-              <a:t>5</a:t>
-            </a:fld>
-            <a:endParaRPr lang="en-US" dirty="0">
-              <a:solidFill>
-                <a:schemeClr val="bg1"/>
-              </a:solidFill>
-            </a:endParaRPr>
-          </a:p>
-        </p:txBody>
-      </p:sp>
     </p:spTree>
     <p:extLst>
       <p:ext uri="{BB962C8B-B14F-4D97-AF65-F5344CB8AC3E}">
         <p14:creationId xmlns:p14="http://schemas.microsoft.com/office/powerpoint/2010/main" val="3113702941"/>
-      </p:ext>
-    </p:extLst>
-  </p:cSld>
-  <p:clrMapOvr>
-    <a:masterClrMapping/>
-  </p:clrMapOvr>
-</p:sld>
-</file>
-
-<file path=ppt/slides/slide6.xml><?xml version="1.0" encoding="utf-8"?>
-<p:sld xmlns:a="http://schemas.openxmlformats.org/drawingml/2006/main" xmlns:r="http://schemas.openxmlformats.org/officeDocument/2006/relationships" xmlns:p="http://schemas.openxmlformats.org/presentationml/2006/main">
-  <p:cSld>
-    <p:bg>
-      <p:bgPr>
-        <a:gradFill flip="none" rotWithShape="1">
-          <a:gsLst>
-            <a:gs pos="0">
-              <a:srgbClr val="504753"/>
-            </a:gs>
-            <a:gs pos="50000">
-              <a:srgbClr val="796C7E"/>
-            </a:gs>
-            <a:gs pos="100000">
-              <a:srgbClr val="504753"/>
-            </a:gs>
-          </a:gsLst>
-          <a:lin ang="2700000" scaled="1"/>
-          <a:tileRect/>
-        </a:gradFill>
-        <a:effectLst/>
-      </p:bgPr>
-    </p:bg>
-    <p:spTree>
-      <p:nvGrpSpPr>
-        <p:cNvPr id="1" name=""/>
-        <p:cNvGrpSpPr/>
-        <p:nvPr/>
-      </p:nvGrpSpPr>
-      <p:grpSpPr>
-        <a:xfrm>
-          <a:off x="0" y="0"/>
-          <a:ext cx="0" cy="0"/>
-          <a:chOff x="0" y="0"/>
-          <a:chExt cx="0" cy="0"/>
-        </a:xfrm>
-      </p:grpSpPr>
-      <p:sp>
-        <p:nvSpPr>
-          <p:cNvPr id="2" name="Titre 1">
-            <a:extLst>
-              <a:ext uri="{FF2B5EF4-FFF2-40B4-BE49-F238E27FC236}">
-                <a16:creationId xmlns:a16="http://schemas.microsoft.com/office/drawing/2014/main" id="{D14F7933-181C-4296-A745-4D8519998823}"/>
-              </a:ext>
-            </a:extLst>
-          </p:cNvPr>
-          <p:cNvSpPr>
-            <a:spLocks noGrp="1"/>
-          </p:cNvSpPr>
-          <p:nvPr>
-            <p:ph type="title"/>
-          </p:nvPr>
-        </p:nvSpPr>
-        <p:spPr/>
-        <p:txBody>
-          <a:bodyPr>
-            <a:normAutofit/>
-          </a:bodyPr>
-          <a:lstStyle/>
-          <a:p>
-            <a:r>
-              <a:rPr lang="fr-FR" sz="4800" cap="all" dirty="0">
-                <a:solidFill>
-                  <a:schemeClr val="bg1"/>
-                </a:solidFill>
-                <a:latin typeface="Abadi Extra Light" panose="020B0204020104020204" pitchFamily="34" charset="0"/>
-                <a:cs typeface="Aparajita" panose="02020603050405020304" pitchFamily="18" charset="0"/>
-              </a:rPr>
-              <a:t>Corrections</a:t>
-            </a:r>
-          </a:p>
-        </p:txBody>
-      </p:sp>
-      <p:sp>
-        <p:nvSpPr>
-          <p:cNvPr id="3" name="Espace réservé du contenu 2">
-            <a:extLst>
-              <a:ext uri="{FF2B5EF4-FFF2-40B4-BE49-F238E27FC236}">
-                <a16:creationId xmlns:a16="http://schemas.microsoft.com/office/drawing/2014/main" id="{FC447053-0E22-4A33-8DB6-6CC29C3A1B0B}"/>
-              </a:ext>
-            </a:extLst>
-          </p:cNvPr>
-          <p:cNvSpPr>
-            <a:spLocks noGrp="1"/>
-          </p:cNvSpPr>
-          <p:nvPr>
-            <p:ph idx="1"/>
-          </p:nvPr>
-        </p:nvSpPr>
-        <p:spPr>
-          <a:xfrm>
-            <a:off x="838200" y="3489820"/>
-            <a:ext cx="10515600" cy="1233182"/>
-          </a:xfrm>
-        </p:spPr>
-        <p:txBody>
-          <a:bodyPr>
-            <a:normAutofit/>
-          </a:bodyPr>
-          <a:lstStyle/>
-          <a:p>
-            <a:pPr marL="0" indent="0" algn="ctr">
-              <a:buNone/>
-            </a:pPr>
-            <a:r>
-              <a:rPr lang="fr-FR" sz="4400" dirty="0">
-                <a:solidFill>
-                  <a:schemeClr val="bg1"/>
-                </a:solidFill>
-                <a:latin typeface="Abadi Extra Light" panose="020B0204020104020204" pitchFamily="34" charset="0"/>
-              </a:rPr>
-              <a:t>Injections SQL</a:t>
-            </a:r>
-          </a:p>
-        </p:txBody>
-      </p:sp>
-      <p:cxnSp>
-        <p:nvCxnSpPr>
-          <p:cNvPr id="5" name="Connecteur droit 4">
-            <a:extLst>
-              <a:ext uri="{FF2B5EF4-FFF2-40B4-BE49-F238E27FC236}">
-                <a16:creationId xmlns:a16="http://schemas.microsoft.com/office/drawing/2014/main" id="{D0711901-2FA1-404A-8358-9552E5B2A907}"/>
-              </a:ext>
-            </a:extLst>
-          </p:cNvPr>
-          <p:cNvCxnSpPr>
-            <a:cxnSpLocks/>
-          </p:cNvCxnSpPr>
-          <p:nvPr/>
-        </p:nvCxnSpPr>
-        <p:spPr>
-          <a:xfrm>
-            <a:off x="942392" y="1418252"/>
-            <a:ext cx="8864082" cy="0"/>
-          </a:xfrm>
-          <a:prstGeom prst="line">
-            <a:avLst/>
-          </a:prstGeom>
-          <a:ln w="41275">
-            <a:solidFill>
-              <a:schemeClr val="bg1"/>
-            </a:solidFill>
-          </a:ln>
-        </p:spPr>
-        <p:style>
-          <a:lnRef idx="1">
-            <a:schemeClr val="accent1"/>
-          </a:lnRef>
-          <a:fillRef idx="0">
-            <a:schemeClr val="accent1"/>
-          </a:fillRef>
-          <a:effectRef idx="0">
-            <a:schemeClr val="accent1"/>
-          </a:effectRef>
-          <a:fontRef idx="minor">
-            <a:schemeClr val="tx1"/>
-          </a:fontRef>
-        </p:style>
-      </p:cxnSp>
-      <p:sp>
-        <p:nvSpPr>
-          <p:cNvPr id="4" name="Espace réservé du numéro de diapositive 3">
-            <a:extLst>
-              <a:ext uri="{FF2B5EF4-FFF2-40B4-BE49-F238E27FC236}">
-                <a16:creationId xmlns:a16="http://schemas.microsoft.com/office/drawing/2014/main" id="{96F3A8A1-D1D6-4263-BFAE-62B4B61D44BB}"/>
-              </a:ext>
-            </a:extLst>
-          </p:cNvPr>
-          <p:cNvSpPr>
-            <a:spLocks noGrp="1"/>
-          </p:cNvSpPr>
-          <p:nvPr>
-            <p:ph type="sldNum" sz="quarter" idx="12"/>
-          </p:nvPr>
-        </p:nvSpPr>
-        <p:spPr/>
-        <p:txBody>
-          <a:bodyPr/>
-          <a:lstStyle/>
-          <a:p>
-            <a:fld id="{3A98EE3D-8CD1-4C3F-BD1C-C98C9596463C}" type="slidenum">
-              <a:rPr lang="en-US" smtClean="0">
-                <a:solidFill>
-                  <a:schemeClr val="bg1"/>
-                </a:solidFill>
-              </a:rPr>
-              <a:t>6</a:t>
-            </a:fld>
-            <a:endParaRPr lang="en-US" dirty="0">
-              <a:solidFill>
-                <a:schemeClr val="bg1"/>
-              </a:solidFill>
-            </a:endParaRPr>
-          </a:p>
-        </p:txBody>
-      </p:sp>
-    </p:spTree>
-    <p:extLst>
-      <p:ext uri="{BB962C8B-B14F-4D97-AF65-F5344CB8AC3E}">
-        <p14:creationId xmlns:p14="http://schemas.microsoft.com/office/powerpoint/2010/main" val="1935133178"/>
       </p:ext>
     </p:extLst>
   </p:cSld>
@@ -5458,7 +5217,7 @@
                 <a:latin typeface="Abadi Extra Light" panose="020B0204020104020204" pitchFamily="34" charset="0"/>
                 <a:cs typeface="Aparajita" panose="02020603050405020304" pitchFamily="18" charset="0"/>
               </a:rPr>
-              <a:t>Conclusion</a:t>
+              <a:t>Corrections</a:t>
             </a:r>
           </a:p>
         </p:txBody>
@@ -5481,13 +5240,13 @@
         </p:nvSpPr>
         <p:spPr>
           <a:xfrm>
-            <a:off x="838200" y="1967116"/>
-            <a:ext cx="10515600" cy="4571796"/>
+            <a:off x="838200" y="3489820"/>
+            <a:ext cx="10515600" cy="1233182"/>
           </a:xfrm>
         </p:spPr>
         <p:txBody>
           <a:bodyPr>
-            <a:normAutofit/>
+            <a:normAutofit fontScale="92500" lnSpcReduction="10000"/>
           </a:bodyPr>
           <a:lstStyle/>
           <a:p>
@@ -5495,99 +5254,70 @@
               <a:buNone/>
             </a:pPr>
             <a:r>
-              <a:rPr lang="fr-FR" dirty="0">
+              <a:rPr lang="fr-FR" sz="4400" dirty="0">
                 <a:solidFill>
                   <a:schemeClr val="bg1"/>
                 </a:solidFill>
                 <a:latin typeface="Abadi Extra Light" panose="020B0204020104020204" pitchFamily="34" charset="0"/>
               </a:rPr>
-              <a:t>Temps restant suffisant</a:t>
+              <a:t>Sécurité</a:t>
             </a:r>
           </a:p>
           <a:p>
             <a:pPr marL="0" indent="0" algn="ctr">
               <a:buNone/>
             </a:pPr>
-            <a:endParaRPr lang="fr-FR" dirty="0">
+            <a:r>
+              <a:rPr lang="fr-FR" sz="4400">
+                <a:solidFill>
+                  <a:schemeClr val="bg1"/>
+                </a:solidFill>
+                <a:latin typeface="Abadi Extra Light" panose="020B0204020104020204" pitchFamily="34" charset="0"/>
+              </a:rPr>
+              <a:t>Fonctionnalités</a:t>
+            </a:r>
+            <a:endParaRPr lang="fr-FR" sz="4400" dirty="0">
               <a:solidFill>
                 <a:schemeClr val="bg1"/>
               </a:solidFill>
               <a:latin typeface="Abadi Extra Light" panose="020B0204020104020204" pitchFamily="34" charset="0"/>
             </a:endParaRPr>
           </a:p>
-          <a:p>
-            <a:pPr marL="0" indent="0" algn="ctr">
-              <a:buNone/>
-            </a:pPr>
-            <a:r>
-              <a:rPr lang="fr-FR" dirty="0">
+        </p:txBody>
+      </p:sp>
+      <p:sp>
+        <p:nvSpPr>
+          <p:cNvPr id="4" name="Espace réservé du numéro de diapositive 3">
+            <a:extLst>
+              <a:ext uri="{FF2B5EF4-FFF2-40B4-BE49-F238E27FC236}">
+                <a16:creationId xmlns:a16="http://schemas.microsoft.com/office/drawing/2014/main" id="{96F3A8A1-D1D6-4263-BFAE-62B4B61D44BB}"/>
+              </a:ext>
+            </a:extLst>
+          </p:cNvPr>
+          <p:cNvSpPr>
+            <a:spLocks noGrp="1"/>
+          </p:cNvSpPr>
+          <p:nvPr>
+            <p:ph type="sldNum" sz="quarter" idx="12"/>
+          </p:nvPr>
+        </p:nvSpPr>
+        <p:spPr/>
+        <p:txBody>
+          <a:bodyPr/>
+          <a:lstStyle/>
+          <a:p>
+            <a:fld id="{3A98EE3D-8CD1-4C3F-BD1C-C98C9596463C}" type="slidenum">
+              <a:rPr lang="en-US" smtClean="0">
                 <a:solidFill>
                   <a:schemeClr val="bg1"/>
                 </a:solidFill>
-                <a:latin typeface="Abadi Extra Light" panose="020B0204020104020204" pitchFamily="34" charset="0"/>
               </a:rPr>
-              <a:t>Pour le prochain rendez-vous :</a:t>
-            </a:r>
-          </a:p>
-          <a:p>
-            <a:pPr marL="0" indent="0" algn="ctr">
-              <a:buNone/>
-            </a:pPr>
-            <a:endParaRPr lang="fr-FR" dirty="0">
+              <a:t>7</a:t>
+            </a:fld>
+            <a:endParaRPr lang="en-US" dirty="0">
               <a:solidFill>
                 <a:schemeClr val="bg1"/>
               </a:solidFill>
-              <a:latin typeface="Abadi Extra Light" panose="020B0204020104020204" pitchFamily="34" charset="0"/>
-            </a:endParaRPr>
-          </a:p>
-          <a:p>
-            <a:pPr marL="0" indent="0" algn="ctr">
-              <a:buNone/>
-            </a:pPr>
-            <a:r>
-              <a:rPr lang="fr-FR" dirty="0">
-                <a:solidFill>
-                  <a:schemeClr val="bg1"/>
-                </a:solidFill>
-                <a:latin typeface="Abadi Extra Light" panose="020B0204020104020204" pitchFamily="34" charset="0"/>
-              </a:rPr>
-              <a:t>- Finalisation de la fenêtre activité</a:t>
-            </a:r>
-          </a:p>
-          <a:p>
-            <a:pPr marL="0" indent="0" algn="ctr">
-              <a:buNone/>
-            </a:pPr>
-            <a:endParaRPr lang="fr-FR" dirty="0">
-              <a:solidFill>
-                <a:schemeClr val="bg1"/>
-              </a:solidFill>
-              <a:latin typeface="Abadi Extra Light" panose="020B0204020104020204" pitchFamily="34" charset="0"/>
-            </a:endParaRPr>
-          </a:p>
-          <a:p>
-            <a:pPr marL="0" indent="0" algn="ctr">
-              <a:buNone/>
-            </a:pPr>
-            <a:r>
-              <a:rPr lang="fr-FR" dirty="0">
-                <a:solidFill>
-                  <a:schemeClr val="bg1"/>
-                </a:solidFill>
-                <a:latin typeface="Abadi Extra Light" panose="020B0204020104020204" pitchFamily="34" charset="0"/>
-              </a:rPr>
-              <a:t>- Amélioration du design du tableau</a:t>
-            </a:r>
-          </a:p>
-          <a:p>
-            <a:pPr marL="0" indent="0" algn="ctr">
-              <a:buNone/>
-            </a:pPr>
-            <a:endParaRPr lang="fr-FR" dirty="0">
-              <a:solidFill>
-                <a:schemeClr val="bg1"/>
-              </a:solidFill>
-              <a:latin typeface="Abadi Extra Light" panose="020B0204020104020204" pitchFamily="34" charset="0"/>
             </a:endParaRPr>
           </a:p>
         </p:txBody>
@@ -5635,47 +5365,10 @@
           </a:fontRef>
         </p:style>
       </p:cxnSp>
-      <p:sp>
-        <p:nvSpPr>
-          <p:cNvPr id="4" name="Espace réservé du numéro de diapositive 3">
-            <a:extLst>
-              <a:ext uri="{FF2B5EF4-FFF2-40B4-BE49-F238E27FC236}">
-                <a16:creationId xmlns:a16="http://schemas.microsoft.com/office/drawing/2014/main" id="{34A18750-ECB8-4822-9F1E-2F94BC79D35B}"/>
-              </a:ext>
-            </a:extLst>
-          </p:cNvPr>
-          <p:cNvSpPr>
-            <a:spLocks noGrp="1"/>
-          </p:cNvSpPr>
-          <p:nvPr>
-            <p:ph type="sldNum" sz="quarter" idx="12"/>
-          </p:nvPr>
-        </p:nvSpPr>
-        <p:spPr/>
-        <p:txBody>
-          <a:bodyPr/>
-          <a:lstStyle/>
-          <a:p>
-            <a:fld id="{3A98EE3D-8CD1-4C3F-BD1C-C98C9596463C}" type="slidenum">
-              <a:rPr lang="en-US" smtClean="0">
-                <a:solidFill>
-                  <a:schemeClr val="bg1"/>
-                </a:solidFill>
-              </a:rPr>
-              <a:t>7</a:t>
-            </a:fld>
-            <a:endParaRPr lang="en-US" dirty="0">
-              <a:solidFill>
-                <a:schemeClr val="bg1"/>
-              </a:solidFill>
-            </a:endParaRPr>
-          </a:p>
-        </p:txBody>
-      </p:sp>
     </p:spTree>
     <p:extLst>
       <p:ext uri="{BB962C8B-B14F-4D97-AF65-F5344CB8AC3E}">
-        <p14:creationId xmlns:p14="http://schemas.microsoft.com/office/powerpoint/2010/main" val="4147953215"/>
+        <p14:creationId xmlns:p14="http://schemas.microsoft.com/office/powerpoint/2010/main" val="1935133178"/>
       </p:ext>
     </p:extLst>
   </p:cSld>
@@ -5735,6 +5428,290 @@
             <a:spLocks noGrp="1"/>
           </p:cNvSpPr>
           <p:nvPr>
+            <p:ph type="title"/>
+          </p:nvPr>
+        </p:nvSpPr>
+        <p:spPr/>
+        <p:txBody>
+          <a:bodyPr>
+            <a:normAutofit/>
+          </a:bodyPr>
+          <a:lstStyle/>
+          <a:p>
+            <a:r>
+              <a:rPr lang="fr-FR" sz="4800" cap="all" dirty="0">
+                <a:solidFill>
+                  <a:schemeClr val="bg1"/>
+                </a:solidFill>
+                <a:latin typeface="Abadi Extra Light" panose="020B0204020104020204" pitchFamily="34" charset="0"/>
+                <a:cs typeface="Aparajita" panose="02020603050405020304" pitchFamily="18" charset="0"/>
+              </a:rPr>
+              <a:t>Conclusion</a:t>
+            </a:r>
+          </a:p>
+        </p:txBody>
+      </p:sp>
+      <p:sp>
+        <p:nvSpPr>
+          <p:cNvPr id="3" name="Espace réservé du contenu 2">
+            <a:extLst>
+              <a:ext uri="{FF2B5EF4-FFF2-40B4-BE49-F238E27FC236}">
+                <a16:creationId xmlns:a16="http://schemas.microsoft.com/office/drawing/2014/main" id="{FC447053-0E22-4A33-8DB6-6CC29C3A1B0B}"/>
+              </a:ext>
+            </a:extLst>
+          </p:cNvPr>
+          <p:cNvSpPr>
+            <a:spLocks noGrp="1"/>
+          </p:cNvSpPr>
+          <p:nvPr>
+            <p:ph idx="1"/>
+          </p:nvPr>
+        </p:nvSpPr>
+        <p:spPr>
+          <a:xfrm>
+            <a:off x="838200" y="1967116"/>
+            <a:ext cx="10515600" cy="4571796"/>
+          </a:xfrm>
+        </p:spPr>
+        <p:txBody>
+          <a:bodyPr>
+            <a:normAutofit/>
+          </a:bodyPr>
+          <a:lstStyle/>
+          <a:p>
+            <a:pPr marL="0" indent="0" algn="ctr">
+              <a:buNone/>
+            </a:pPr>
+            <a:r>
+              <a:rPr lang="fr-FR" dirty="0">
+                <a:solidFill>
+                  <a:schemeClr val="bg1"/>
+                </a:solidFill>
+                <a:latin typeface="Abadi Extra Light" panose="020B0204020104020204" pitchFamily="34" charset="0"/>
+              </a:rPr>
+              <a:t>Temps restant suffisant</a:t>
+            </a:r>
+          </a:p>
+          <a:p>
+            <a:pPr marL="0" indent="0" algn="ctr">
+              <a:buNone/>
+            </a:pPr>
+            <a:endParaRPr lang="fr-FR" dirty="0">
+              <a:solidFill>
+                <a:schemeClr val="bg1"/>
+              </a:solidFill>
+              <a:latin typeface="Abadi Extra Light" panose="020B0204020104020204" pitchFamily="34" charset="0"/>
+            </a:endParaRPr>
+          </a:p>
+          <a:p>
+            <a:pPr marL="0" indent="0" algn="ctr">
+              <a:buNone/>
+            </a:pPr>
+            <a:r>
+              <a:rPr lang="fr-FR" dirty="0">
+                <a:solidFill>
+                  <a:schemeClr val="bg1"/>
+                </a:solidFill>
+                <a:latin typeface="Abadi Extra Light" panose="020B0204020104020204" pitchFamily="34" charset="0"/>
+              </a:rPr>
+              <a:t>Pour le prochain rendez-vous :</a:t>
+            </a:r>
+          </a:p>
+          <a:p>
+            <a:pPr marL="0" indent="0" algn="ctr">
+              <a:buNone/>
+            </a:pPr>
+            <a:endParaRPr lang="fr-FR" dirty="0">
+              <a:solidFill>
+                <a:schemeClr val="bg1"/>
+              </a:solidFill>
+              <a:latin typeface="Abadi Extra Light" panose="020B0204020104020204" pitchFamily="34" charset="0"/>
+            </a:endParaRPr>
+          </a:p>
+          <a:p>
+            <a:pPr marL="0" indent="0" algn="ctr">
+              <a:buNone/>
+            </a:pPr>
+            <a:r>
+              <a:rPr lang="fr-FR" dirty="0">
+                <a:solidFill>
+                  <a:schemeClr val="bg1"/>
+                </a:solidFill>
+                <a:latin typeface="Abadi Extra Light" panose="020B0204020104020204" pitchFamily="34" charset="0"/>
+              </a:rPr>
+              <a:t>- Implémentation de la fenêtre activité</a:t>
+            </a:r>
+          </a:p>
+          <a:p>
+            <a:pPr marL="0" indent="0" algn="ctr">
+              <a:buNone/>
+            </a:pPr>
+            <a:endParaRPr lang="fr-FR" dirty="0">
+              <a:solidFill>
+                <a:schemeClr val="bg1"/>
+              </a:solidFill>
+              <a:latin typeface="Abadi Extra Light" panose="020B0204020104020204" pitchFamily="34" charset="0"/>
+            </a:endParaRPr>
+          </a:p>
+          <a:p>
+            <a:pPr marL="0" indent="0" algn="ctr">
+              <a:buNone/>
+            </a:pPr>
+            <a:r>
+              <a:rPr lang="fr-FR" dirty="0">
+                <a:solidFill>
+                  <a:schemeClr val="bg1"/>
+                </a:solidFill>
+                <a:latin typeface="Abadi Extra Light" panose="020B0204020104020204" pitchFamily="34" charset="0"/>
+              </a:rPr>
+              <a:t>- Amélioration de différents point de design</a:t>
+            </a:r>
+          </a:p>
+        </p:txBody>
+      </p:sp>
+      <p:sp>
+        <p:nvSpPr>
+          <p:cNvPr id="4" name="Espace réservé du numéro de diapositive 3">
+            <a:extLst>
+              <a:ext uri="{FF2B5EF4-FFF2-40B4-BE49-F238E27FC236}">
+                <a16:creationId xmlns:a16="http://schemas.microsoft.com/office/drawing/2014/main" id="{34A18750-ECB8-4822-9F1E-2F94BC79D35B}"/>
+              </a:ext>
+            </a:extLst>
+          </p:cNvPr>
+          <p:cNvSpPr>
+            <a:spLocks noGrp="1"/>
+          </p:cNvSpPr>
+          <p:nvPr>
+            <p:ph type="sldNum" sz="quarter" idx="12"/>
+          </p:nvPr>
+        </p:nvSpPr>
+        <p:spPr/>
+        <p:txBody>
+          <a:bodyPr/>
+          <a:lstStyle/>
+          <a:p>
+            <a:fld id="{3A98EE3D-8CD1-4C3F-BD1C-C98C9596463C}" type="slidenum">
+              <a:rPr lang="en-US" smtClean="0">
+                <a:solidFill>
+                  <a:schemeClr val="bg1"/>
+                </a:solidFill>
+              </a:rPr>
+              <a:t>8</a:t>
+            </a:fld>
+            <a:endParaRPr lang="en-US" dirty="0">
+              <a:solidFill>
+                <a:schemeClr val="bg1"/>
+              </a:solidFill>
+            </a:endParaRPr>
+          </a:p>
+        </p:txBody>
+      </p:sp>
+      <p:cxnSp>
+        <p:nvCxnSpPr>
+          <p:cNvPr id="5" name="Connecteur droit 4">
+            <a:extLst>
+              <a:ext uri="{FF2B5EF4-FFF2-40B4-BE49-F238E27FC236}">
+                <a16:creationId xmlns:a16="http://schemas.microsoft.com/office/drawing/2014/main" id="{D0711901-2FA1-404A-8358-9552E5B2A907}"/>
+              </a:ext>
+            </a:extLst>
+          </p:cNvPr>
+          <p:cNvCxnSpPr>
+            <a:cxnSpLocks/>
+          </p:cNvCxnSpPr>
+          <p:nvPr/>
+        </p:nvCxnSpPr>
+        <p:spPr>
+          <a:xfrm>
+            <a:off x="942392" y="1418252"/>
+            <a:ext cx="8864082" cy="0"/>
+          </a:xfrm>
+          <a:prstGeom prst="line">
+            <a:avLst/>
+          </a:prstGeom>
+          <a:ln w="41275">
+            <a:solidFill>
+              <a:schemeClr val="bg1"/>
+            </a:solidFill>
+          </a:ln>
+        </p:spPr>
+        <p:style>
+          <a:lnRef idx="1">
+            <a:schemeClr val="accent1"/>
+          </a:lnRef>
+          <a:fillRef idx="0">
+            <a:schemeClr val="accent1"/>
+          </a:fillRef>
+          <a:effectRef idx="0">
+            <a:schemeClr val="accent1"/>
+          </a:effectRef>
+          <a:fontRef idx="minor">
+            <a:schemeClr val="tx1"/>
+          </a:fontRef>
+        </p:style>
+      </p:cxnSp>
+    </p:spTree>
+    <p:extLst>
+      <p:ext uri="{BB962C8B-B14F-4D97-AF65-F5344CB8AC3E}">
+        <p14:creationId xmlns:p14="http://schemas.microsoft.com/office/powerpoint/2010/main" val="4147953215"/>
+      </p:ext>
+    </p:extLst>
+  </p:cSld>
+  <p:clrMapOvr>
+    <a:masterClrMapping/>
+  </p:clrMapOvr>
+</p:sld>
+</file>
+
+<file path=ppt/slides/slide9.xml><?xml version="1.0" encoding="utf-8"?>
+<p:sld xmlns:a="http://schemas.openxmlformats.org/drawingml/2006/main" xmlns:r="http://schemas.openxmlformats.org/officeDocument/2006/relationships" xmlns:p="http://schemas.openxmlformats.org/presentationml/2006/main">
+  <p:cSld>
+    <p:bg>
+      <p:bgPr>
+        <a:gradFill flip="none" rotWithShape="1">
+          <a:gsLst>
+            <a:gs pos="0">
+              <a:srgbClr val="504753"/>
+            </a:gs>
+            <a:gs pos="50000">
+              <a:srgbClr val="796C7E"/>
+            </a:gs>
+            <a:gs pos="100000">
+              <a:srgbClr val="504753"/>
+            </a:gs>
+          </a:gsLst>
+          <a:lin ang="2700000" scaled="1"/>
+          <a:tileRect/>
+        </a:gradFill>
+        <a:effectLst/>
+      </p:bgPr>
+    </p:bg>
+    <p:spTree>
+      <p:nvGrpSpPr>
+        <p:cNvPr id="1" name=""/>
+        <p:cNvGrpSpPr/>
+        <p:nvPr/>
+      </p:nvGrpSpPr>
+      <p:grpSpPr>
+        <a:xfrm>
+          <a:off x="0" y="0"/>
+          <a:ext cx="0" cy="0"/>
+          <a:chOff x="0" y="0"/>
+          <a:chExt cx="0" cy="0"/>
+        </a:xfrm>
+      </p:grpSpPr>
+      <p:sp>
+        <p:nvSpPr>
+          <p:cNvPr id="2" name="Titre 1">
+            <a:extLst>
+              <a:ext uri="{FF2B5EF4-FFF2-40B4-BE49-F238E27FC236}">
+                <a16:creationId xmlns:a16="http://schemas.microsoft.com/office/drawing/2014/main" id="{D14F7933-181C-4296-A745-4D8519998823}"/>
+              </a:ext>
+            </a:extLst>
+          </p:cNvPr>
+          <p:cNvSpPr>
+            <a:spLocks noGrp="1"/>
+          </p:cNvSpPr>
+          <p:nvPr>
             <p:ph type="ctrTitle"/>
           </p:nvPr>
         </p:nvSpPr>
@@ -5831,9 +5808,9 @@
 </file>
 
 <file path=ppt/theme/theme1.xml><?xml version="1.0" encoding="utf-8"?>
-<a:theme xmlns:a="http://schemas.openxmlformats.org/drawingml/2006/main" name="Thème Office">
+<a:theme xmlns:a="http://schemas.openxmlformats.org/drawingml/2006/main" name="Office Theme">
   <a:themeElements>
-    <a:clrScheme name="Office">
+    <a:clrScheme name="Thème Office">
       <a:dk1>
         <a:sysClr val="windowText" lastClr="000000"/>
       </a:dk1>
@@ -5871,7 +5848,7 @@
         <a:srgbClr val="954F72"/>
       </a:folHlink>
     </a:clrScheme>
-    <a:fontScheme name="Office">
+    <a:fontScheme name="Thème Office">
       <a:majorFont>
         <a:latin typeface="Calibri Light" panose="020F0302020204030204"/>
         <a:ea typeface=""/>
@@ -5906,23 +5883,6 @@
         <a:font script="Viet" typeface="Times New Roman"/>
         <a:font script="Uigh" typeface="Microsoft Uighur"/>
         <a:font script="Geor" typeface="Sylfaen"/>
-        <a:font script="Armn" typeface="Arial"/>
-        <a:font script="Bugi" typeface="Leelawadee UI"/>
-        <a:font script="Bopo" typeface="Microsoft JhengHei"/>
-        <a:font script="Java" typeface="Javanese Text"/>
-        <a:font script="Lisu" typeface="Segoe UI"/>
-        <a:font script="Mymr" typeface="Myanmar Text"/>
-        <a:font script="Nkoo" typeface="Ebrima"/>
-        <a:font script="Olck" typeface="Nirmala UI"/>
-        <a:font script="Osma" typeface="Ebrima"/>
-        <a:font script="Phag" typeface="Phagspa"/>
-        <a:font script="Syrn" typeface="Estrangelo Edessa"/>
-        <a:font script="Syrj" typeface="Estrangelo Edessa"/>
-        <a:font script="Syre" typeface="Estrangelo Edessa"/>
-        <a:font script="Sora" typeface="Nirmala UI"/>
-        <a:font script="Tale" typeface="Microsoft Tai Le"/>
-        <a:font script="Talu" typeface="Microsoft New Tai Lue"/>
-        <a:font script="Tfng" typeface="Ebrima"/>
       </a:majorFont>
       <a:minorFont>
         <a:latin typeface="Calibri" panose="020F0502020204030204"/>
@@ -5958,26 +5918,9 @@
         <a:font script="Viet" typeface="Arial"/>
         <a:font script="Uigh" typeface="Microsoft Uighur"/>
         <a:font script="Geor" typeface="Sylfaen"/>
-        <a:font script="Armn" typeface="Arial"/>
-        <a:font script="Bugi" typeface="Leelawadee UI"/>
-        <a:font script="Bopo" typeface="Microsoft JhengHei"/>
-        <a:font script="Java" typeface="Javanese Text"/>
-        <a:font script="Lisu" typeface="Segoe UI"/>
-        <a:font script="Mymr" typeface="Myanmar Text"/>
-        <a:font script="Nkoo" typeface="Ebrima"/>
-        <a:font script="Olck" typeface="Nirmala UI"/>
-        <a:font script="Osma" typeface="Ebrima"/>
-        <a:font script="Phag" typeface="Phagspa"/>
-        <a:font script="Syrn" typeface="Estrangelo Edessa"/>
-        <a:font script="Syrj" typeface="Estrangelo Edessa"/>
-        <a:font script="Syre" typeface="Estrangelo Edessa"/>
-        <a:font script="Sora" typeface="Nirmala UI"/>
-        <a:font script="Tale" typeface="Microsoft Tai Le"/>
-        <a:font script="Talu" typeface="Microsoft New Tai Lue"/>
-        <a:font script="Tfng" typeface="Ebrima"/>
       </a:minorFont>
     </a:fontScheme>
-    <a:fmtScheme name="Office">
+    <a:fmtScheme name="Thème Office">
       <a:fillStyleLst>
         <a:solidFill>
           <a:schemeClr val="phClr"/>

</xml_diff>